<commit_message>
surf poster, atp synthase colabs complete
</commit_message>
<xml_diff>
--- a/miscellaneous/presentations/20200813_surf_poster_pres.pptx
+++ b/miscellaneous/presentations/20200813_surf_poster_pres.pptx
@@ -4,6 +4,9 @@
   <p:sldMasterIdLst>
     <p:sldMasterId id="2147483651" r:id="rId1"/>
   </p:sldMasterIdLst>
+  <p:notesMasterIdLst>
+    <p:notesMasterId r:id="rId3"/>
+  </p:notesMasterIdLst>
   <p:sldIdLst>
     <p:sldId id="256" r:id="rId2"/>
   </p:sldIdLst>
@@ -1125,6 +1128,439 @@
 </cs:chartStyle>
 </file>
 
+<file path=ppt/notesMasters/notesMaster1.xml><?xml version="1.0" encoding="utf-8"?>
+<p:notesMaster xmlns:a="http://schemas.openxmlformats.org/drawingml/2006/main" xmlns:r="http://schemas.openxmlformats.org/officeDocument/2006/relationships" xmlns:p="http://schemas.openxmlformats.org/presentationml/2006/main">
+  <p:cSld>
+    <p:bg>
+      <p:bgRef idx="1001">
+        <a:schemeClr val="bg1"/>
+      </p:bgRef>
+    </p:bg>
+    <p:spTree>
+      <p:nvGrpSpPr>
+        <p:cNvPr id="1" name=""/>
+        <p:cNvGrpSpPr/>
+        <p:nvPr/>
+      </p:nvGrpSpPr>
+      <p:grpSpPr>
+        <a:xfrm>
+          <a:off x="0" y="0"/>
+          <a:ext cx="0" cy="0"/>
+          <a:chOff x="0" y="0"/>
+          <a:chExt cx="0" cy="0"/>
+        </a:xfrm>
+      </p:grpSpPr>
+      <p:sp>
+        <p:nvSpPr>
+          <p:cNvPr id="2" name="Header Placeholder 1"/>
+          <p:cNvSpPr>
+            <a:spLocks noGrp="1"/>
+          </p:cNvSpPr>
+          <p:nvPr>
+            <p:ph type="hdr" sz="quarter"/>
+          </p:nvPr>
+        </p:nvSpPr>
+        <p:spPr>
+          <a:xfrm>
+            <a:off x="0" y="0"/>
+            <a:ext cx="3035300" cy="465138"/>
+          </a:xfrm>
+          <a:prstGeom prst="rect">
+            <a:avLst/>
+          </a:prstGeom>
+        </p:spPr>
+        <p:txBody>
+          <a:bodyPr vert="horz" lIns="91440" tIns="45720" rIns="91440" bIns="45720" rtlCol="0"/>
+          <a:lstStyle>
+            <a:lvl1pPr algn="l">
+              <a:defRPr sz="1200"/>
+            </a:lvl1pPr>
+          </a:lstStyle>
+          <a:p>
+            <a:endParaRPr lang="en-US"/>
+          </a:p>
+        </p:txBody>
+      </p:sp>
+      <p:sp>
+        <p:nvSpPr>
+          <p:cNvPr id="3" name="Date Placeholder 2"/>
+          <p:cNvSpPr>
+            <a:spLocks noGrp="1"/>
+          </p:cNvSpPr>
+          <p:nvPr>
+            <p:ph type="dt" idx="1"/>
+          </p:nvPr>
+        </p:nvSpPr>
+        <p:spPr>
+          <a:xfrm>
+            <a:off x="3967163" y="0"/>
+            <a:ext cx="3035300" cy="465138"/>
+          </a:xfrm>
+          <a:prstGeom prst="rect">
+            <a:avLst/>
+          </a:prstGeom>
+        </p:spPr>
+        <p:txBody>
+          <a:bodyPr vert="horz" lIns="91440" tIns="45720" rIns="91440" bIns="45720" rtlCol="0"/>
+          <a:lstStyle>
+            <a:lvl1pPr algn="r">
+              <a:defRPr sz="1200"/>
+            </a:lvl1pPr>
+          </a:lstStyle>
+          <a:p>
+            <a:fld id="{D0122DAE-40C7-2D42-B6C8-B9C4D6CB2DF1}" type="datetimeFigureOut">
+              <a:rPr lang="en-US" smtClean="0"/>
+              <a:t>8/16/20</a:t>
+            </a:fld>
+            <a:endParaRPr lang="en-US"/>
+          </a:p>
+        </p:txBody>
+      </p:sp>
+      <p:sp>
+        <p:nvSpPr>
+          <p:cNvPr id="4" name="Slide Image Placeholder 3"/>
+          <p:cNvSpPr>
+            <a:spLocks noGrp="1" noRot="1" noChangeAspect="1"/>
+          </p:cNvSpPr>
+          <p:nvPr>
+            <p:ph type="sldImg" idx="2"/>
+          </p:nvPr>
+        </p:nvSpPr>
+        <p:spPr>
+          <a:xfrm>
+            <a:off x="1933575" y="1162050"/>
+            <a:ext cx="3136900" cy="3135313"/>
+          </a:xfrm>
+          <a:prstGeom prst="rect">
+            <a:avLst/>
+          </a:prstGeom>
+          <a:noFill/>
+          <a:ln w="12700">
+            <a:solidFill>
+              <a:prstClr val="black"/>
+            </a:solidFill>
+          </a:ln>
+        </p:spPr>
+        <p:txBody>
+          <a:bodyPr vert="horz" lIns="91440" tIns="45720" rIns="91440" bIns="45720" rtlCol="0" anchor="ctr"/>
+          <a:lstStyle/>
+          <a:p>
+            <a:endParaRPr lang="en-US"/>
+          </a:p>
+        </p:txBody>
+      </p:sp>
+      <p:sp>
+        <p:nvSpPr>
+          <p:cNvPr id="5" name="Notes Placeholder 4"/>
+          <p:cNvSpPr>
+            <a:spLocks noGrp="1"/>
+          </p:cNvSpPr>
+          <p:nvPr>
+            <p:ph type="body" sz="quarter" idx="3"/>
+          </p:nvPr>
+        </p:nvSpPr>
+        <p:spPr>
+          <a:xfrm>
+            <a:off x="700088" y="4470400"/>
+            <a:ext cx="5603875" cy="3659188"/>
+          </a:xfrm>
+          <a:prstGeom prst="rect">
+            <a:avLst/>
+          </a:prstGeom>
+        </p:spPr>
+        <p:txBody>
+          <a:bodyPr vert="horz" lIns="91440" tIns="45720" rIns="91440" bIns="45720" rtlCol="0"/>
+          <a:lstStyle/>
+          <a:p>
+            <a:pPr lvl="0"/>
+            <a:r>
+              <a:rPr lang="en-US"/>
+              <a:t>Click to edit Master text styles</a:t>
+            </a:r>
+          </a:p>
+          <a:p>
+            <a:pPr lvl="1"/>
+            <a:r>
+              <a:rPr lang="en-US"/>
+              <a:t>Second level</a:t>
+            </a:r>
+          </a:p>
+          <a:p>
+            <a:pPr lvl="2"/>
+            <a:r>
+              <a:rPr lang="en-US"/>
+              <a:t>Third level</a:t>
+            </a:r>
+          </a:p>
+          <a:p>
+            <a:pPr lvl="3"/>
+            <a:r>
+              <a:rPr lang="en-US"/>
+              <a:t>Fourth level</a:t>
+            </a:r>
+          </a:p>
+          <a:p>
+            <a:pPr lvl="4"/>
+            <a:r>
+              <a:rPr lang="en-US"/>
+              <a:t>Fifth level</a:t>
+            </a:r>
+          </a:p>
+        </p:txBody>
+      </p:sp>
+      <p:sp>
+        <p:nvSpPr>
+          <p:cNvPr id="6" name="Footer Placeholder 5"/>
+          <p:cNvSpPr>
+            <a:spLocks noGrp="1"/>
+          </p:cNvSpPr>
+          <p:nvPr>
+            <p:ph type="ftr" sz="quarter" idx="4"/>
+          </p:nvPr>
+        </p:nvSpPr>
+        <p:spPr>
+          <a:xfrm>
+            <a:off x="0" y="8824913"/>
+            <a:ext cx="3035300" cy="465137"/>
+          </a:xfrm>
+          <a:prstGeom prst="rect">
+            <a:avLst/>
+          </a:prstGeom>
+        </p:spPr>
+        <p:txBody>
+          <a:bodyPr vert="horz" lIns="91440" tIns="45720" rIns="91440" bIns="45720" rtlCol="0" anchor="b"/>
+          <a:lstStyle>
+            <a:lvl1pPr algn="l">
+              <a:defRPr sz="1200"/>
+            </a:lvl1pPr>
+          </a:lstStyle>
+          <a:p>
+            <a:endParaRPr lang="en-US"/>
+          </a:p>
+        </p:txBody>
+      </p:sp>
+      <p:sp>
+        <p:nvSpPr>
+          <p:cNvPr id="7" name="Slide Number Placeholder 6"/>
+          <p:cNvSpPr>
+            <a:spLocks noGrp="1"/>
+          </p:cNvSpPr>
+          <p:nvPr>
+            <p:ph type="sldNum" sz="quarter" idx="5"/>
+          </p:nvPr>
+        </p:nvSpPr>
+        <p:spPr>
+          <a:xfrm>
+            <a:off x="3967163" y="8824913"/>
+            <a:ext cx="3035300" cy="465137"/>
+          </a:xfrm>
+          <a:prstGeom prst="rect">
+            <a:avLst/>
+          </a:prstGeom>
+        </p:spPr>
+        <p:txBody>
+          <a:bodyPr vert="horz" lIns="91440" tIns="45720" rIns="91440" bIns="45720" rtlCol="0" anchor="b"/>
+          <a:lstStyle>
+            <a:lvl1pPr algn="r">
+              <a:defRPr sz="1200"/>
+            </a:lvl1pPr>
+          </a:lstStyle>
+          <a:p>
+            <a:fld id="{8C42C4BF-8D8E-4548-BFC9-FF95F2FD7865}" type="slidenum">
+              <a:rPr lang="en-US" smtClean="0"/>
+              <a:t>‹#›</a:t>
+            </a:fld>
+            <a:endParaRPr lang="en-US"/>
+          </a:p>
+        </p:txBody>
+      </p:sp>
+    </p:spTree>
+    <p:extLst>
+      <p:ext uri="{BB962C8B-B14F-4D97-AF65-F5344CB8AC3E}">
+        <p14:creationId xmlns:p14="http://schemas.microsoft.com/office/powerpoint/2010/main" val="1182167895"/>
+      </p:ext>
+    </p:extLst>
+  </p:cSld>
+  <p:clrMap bg1="lt1" tx1="dk1" bg2="lt2" tx2="dk2" accent1="accent1" accent2="accent2" accent3="accent3" accent4="accent4" accent5="accent5" accent6="accent6" hlink="hlink" folHlink="folHlink"/>
+  <p:notesStyle>
+    <a:lvl1pPr marL="0" algn="l" defTabSz="914400" rtl="0" eaLnBrk="1" latinLnBrk="0" hangingPunct="1">
+      <a:defRPr sz="1200" kern="1200">
+        <a:solidFill>
+          <a:schemeClr val="tx1"/>
+        </a:solidFill>
+        <a:latin typeface="+mn-lt"/>
+        <a:ea typeface="+mn-ea"/>
+        <a:cs typeface="+mn-cs"/>
+      </a:defRPr>
+    </a:lvl1pPr>
+    <a:lvl2pPr marL="457200" algn="l" defTabSz="914400" rtl="0" eaLnBrk="1" latinLnBrk="0" hangingPunct="1">
+      <a:defRPr sz="1200" kern="1200">
+        <a:solidFill>
+          <a:schemeClr val="tx1"/>
+        </a:solidFill>
+        <a:latin typeface="+mn-lt"/>
+        <a:ea typeface="+mn-ea"/>
+        <a:cs typeface="+mn-cs"/>
+      </a:defRPr>
+    </a:lvl2pPr>
+    <a:lvl3pPr marL="914400" algn="l" defTabSz="914400" rtl="0" eaLnBrk="1" latinLnBrk="0" hangingPunct="1">
+      <a:defRPr sz="1200" kern="1200">
+        <a:solidFill>
+          <a:schemeClr val="tx1"/>
+        </a:solidFill>
+        <a:latin typeface="+mn-lt"/>
+        <a:ea typeface="+mn-ea"/>
+        <a:cs typeface="+mn-cs"/>
+      </a:defRPr>
+    </a:lvl3pPr>
+    <a:lvl4pPr marL="1371600" algn="l" defTabSz="914400" rtl="0" eaLnBrk="1" latinLnBrk="0" hangingPunct="1">
+      <a:defRPr sz="1200" kern="1200">
+        <a:solidFill>
+          <a:schemeClr val="tx1"/>
+        </a:solidFill>
+        <a:latin typeface="+mn-lt"/>
+        <a:ea typeface="+mn-ea"/>
+        <a:cs typeface="+mn-cs"/>
+      </a:defRPr>
+    </a:lvl4pPr>
+    <a:lvl5pPr marL="1828800" algn="l" defTabSz="914400" rtl="0" eaLnBrk="1" latinLnBrk="0" hangingPunct="1">
+      <a:defRPr sz="1200" kern="1200">
+        <a:solidFill>
+          <a:schemeClr val="tx1"/>
+        </a:solidFill>
+        <a:latin typeface="+mn-lt"/>
+        <a:ea typeface="+mn-ea"/>
+        <a:cs typeface="+mn-cs"/>
+      </a:defRPr>
+    </a:lvl5pPr>
+    <a:lvl6pPr marL="2286000" algn="l" defTabSz="914400" rtl="0" eaLnBrk="1" latinLnBrk="0" hangingPunct="1">
+      <a:defRPr sz="1200" kern="1200">
+        <a:solidFill>
+          <a:schemeClr val="tx1"/>
+        </a:solidFill>
+        <a:latin typeface="+mn-lt"/>
+        <a:ea typeface="+mn-ea"/>
+        <a:cs typeface="+mn-cs"/>
+      </a:defRPr>
+    </a:lvl6pPr>
+    <a:lvl7pPr marL="2743200" algn="l" defTabSz="914400" rtl="0" eaLnBrk="1" latinLnBrk="0" hangingPunct="1">
+      <a:defRPr sz="1200" kern="1200">
+        <a:solidFill>
+          <a:schemeClr val="tx1"/>
+        </a:solidFill>
+        <a:latin typeface="+mn-lt"/>
+        <a:ea typeface="+mn-ea"/>
+        <a:cs typeface="+mn-cs"/>
+      </a:defRPr>
+    </a:lvl7pPr>
+    <a:lvl8pPr marL="3200400" algn="l" defTabSz="914400" rtl="0" eaLnBrk="1" latinLnBrk="0" hangingPunct="1">
+      <a:defRPr sz="1200" kern="1200">
+        <a:solidFill>
+          <a:schemeClr val="tx1"/>
+        </a:solidFill>
+        <a:latin typeface="+mn-lt"/>
+        <a:ea typeface="+mn-ea"/>
+        <a:cs typeface="+mn-cs"/>
+      </a:defRPr>
+    </a:lvl8pPr>
+    <a:lvl9pPr marL="3657600" algn="l" defTabSz="914400" rtl="0" eaLnBrk="1" latinLnBrk="0" hangingPunct="1">
+      <a:defRPr sz="1200" kern="1200">
+        <a:solidFill>
+          <a:schemeClr val="tx1"/>
+        </a:solidFill>
+        <a:latin typeface="+mn-lt"/>
+        <a:ea typeface="+mn-ea"/>
+        <a:cs typeface="+mn-cs"/>
+      </a:defRPr>
+    </a:lvl9pPr>
+  </p:notesStyle>
+</p:notesMaster>
+</file>
+
+<file path=ppt/notesSlides/notesSlide1.xml><?xml version="1.0" encoding="utf-8"?>
+<p:notes xmlns:a="http://schemas.openxmlformats.org/drawingml/2006/main" xmlns:r="http://schemas.openxmlformats.org/officeDocument/2006/relationships" xmlns:p="http://schemas.openxmlformats.org/presentationml/2006/main">
+  <p:cSld>
+    <p:spTree>
+      <p:nvGrpSpPr>
+        <p:cNvPr id="1" name=""/>
+        <p:cNvGrpSpPr/>
+        <p:nvPr/>
+      </p:nvGrpSpPr>
+      <p:grpSpPr>
+        <a:xfrm>
+          <a:off x="0" y="0"/>
+          <a:ext cx="0" cy="0"/>
+          <a:chOff x="0" y="0"/>
+          <a:chExt cx="0" cy="0"/>
+        </a:xfrm>
+      </p:grpSpPr>
+      <p:sp>
+        <p:nvSpPr>
+          <p:cNvPr id="2" name="Slide Image Placeholder 1"/>
+          <p:cNvSpPr>
+            <a:spLocks noGrp="1" noRot="1" noChangeAspect="1"/>
+          </p:cNvSpPr>
+          <p:nvPr>
+            <p:ph type="sldImg"/>
+          </p:nvPr>
+        </p:nvSpPr>
+        <p:spPr/>
+      </p:sp>
+      <p:sp>
+        <p:nvSpPr>
+          <p:cNvPr id="3" name="Notes Placeholder 2"/>
+          <p:cNvSpPr>
+            <a:spLocks noGrp="1"/>
+          </p:cNvSpPr>
+          <p:nvPr>
+            <p:ph type="body" idx="1"/>
+          </p:nvPr>
+        </p:nvSpPr>
+        <p:spPr/>
+        <p:txBody>
+          <a:bodyPr/>
+          <a:lstStyle/>
+          <a:p>
+            <a:endParaRPr lang="en-US" dirty="0"/>
+          </a:p>
+        </p:txBody>
+      </p:sp>
+      <p:sp>
+        <p:nvSpPr>
+          <p:cNvPr id="4" name="Slide Number Placeholder 3"/>
+          <p:cNvSpPr>
+            <a:spLocks noGrp="1"/>
+          </p:cNvSpPr>
+          <p:nvPr>
+            <p:ph type="sldNum" sz="quarter" idx="5"/>
+          </p:nvPr>
+        </p:nvSpPr>
+        <p:spPr/>
+        <p:txBody>
+          <a:bodyPr/>
+          <a:lstStyle/>
+          <a:p>
+            <a:fld id="{8C42C4BF-8D8E-4548-BFC9-FF95F2FD7865}" type="slidenum">
+              <a:rPr lang="en-US" smtClean="0"/>
+              <a:t>1</a:t>
+            </a:fld>
+            <a:endParaRPr lang="en-US"/>
+          </a:p>
+        </p:txBody>
+      </p:sp>
+    </p:spTree>
+    <p:extLst>
+      <p:ext uri="{BB962C8B-B14F-4D97-AF65-F5344CB8AC3E}">
+        <p14:creationId xmlns:p14="http://schemas.microsoft.com/office/powerpoint/2010/main" val="546912423"/>
+      </p:ext>
+    </p:extLst>
+  </p:cSld>
+  <p:clrMapOvr>
+    <a:masterClrMapping/>
+  </p:clrMapOvr>
+</p:notes>
+</file>
+
 <file path=ppt/slideLayouts/slideLayout1.xml><?xml version="1.0" encoding="utf-8"?>
 <p:sldLayout xmlns:a="http://schemas.openxmlformats.org/drawingml/2006/main" xmlns:r="http://schemas.openxmlformats.org/officeDocument/2006/relationships" xmlns:p="http://schemas.openxmlformats.org/presentationml/2006/main" type="title" preserve="1">
   <p:cSld name="Title Slide">
@@ -5988,7 +6424,7 @@
                 <a:latin typeface="Avenir Book" panose="02000503020000020003" pitchFamily="2" charset="0"/>
                 <a:ea typeface="Cambria Math" panose="02040503050406030204" pitchFamily="18" charset="0"/>
               </a:rPr>
-              <a:t>Modeling a Glucose Pathway and an ATP Synthase Mechanism shows ATP Life Extension in Synthetic Cells</a:t>
+              <a:t>Modeling a Glucose Pathway and an ATP Synthase Mechanism to show ATP Life Extension in Synthetic Cells</a:t>
             </a:r>
           </a:p>
         </p:txBody>
@@ -6519,7 +6955,7 @@
         <p:spPr>
           <a:xfrm>
             <a:off x="20116802" y="35623502"/>
-            <a:ext cx="3555192" cy="915629"/>
+            <a:ext cx="18108856" cy="915629"/>
           </a:xfrm>
           <a:prstGeom prst="rect">
             <a:avLst/>
@@ -6537,7 +6973,7 @@
                 <a:latin typeface="Avenir Book" panose="02000503020000020003" pitchFamily="2" charset="0"/>
                 <a:ea typeface="Cambria Math" panose="02040503050406030204" pitchFamily="18" charset="0"/>
               </a:rPr>
-              <a:t>References</a:t>
+              <a:t>References THANK YOU TO SAMEL KRON AND FELLOW</a:t>
             </a:r>
           </a:p>
         </p:txBody>
@@ -6553,7 +6989,7 @@
         <p:spPr bwMode="auto">
           <a:xfrm>
             <a:off x="1645920" y="6675120"/>
-            <a:ext cx="11704320" cy="8217610"/>
+            <a:ext cx="11704320" cy="7971389"/>
           </a:xfrm>
           <a:prstGeom prst="rect">
             <a:avLst/>
@@ -6674,7 +7110,7 @@
           </a:lstStyle>
           <a:p>
             <a:r>
-              <a:rPr lang="en-US" sz="3200" dirty="0">
+              <a:rPr lang="en-US" sz="3100" dirty="0">
                 <a:latin typeface="Avenir Book" panose="02000503020000020003" pitchFamily="2" charset="0"/>
               </a:rPr>
               <a:t>In synthetic cell protein synthesis, a common limiting factor is the energy supply for transcription and translation. By studying computational and mathematical models of various ATP regeneration mechanisms in synthetic cells, we aim to propose experimental methods for ATP life extension. We use available software tools to study two models. These allow us to develop and study mass action models by implementing simple chemical reaction networks. Our simulations show that a glucose metabolic pathway can extend lifetime of ATP up to about 60 hours. Integrating ATP synthase can also independently lengthen the lifetime of ATP to various times depending on the implemented proton gradient mechanism. To ensure prolonged synthetic cell protein synthesis, either the glucose pathway or ATP synthase mechanism can be used. In the future, it will be useful to perform wet-lab experiments in order to compare our model to data.</a:t>
@@ -6750,8 +7186,8 @@
         </p:nvSpPr>
         <p:spPr bwMode="auto">
           <a:xfrm>
-            <a:off x="14264640" y="16276320"/>
-            <a:ext cx="11704320" cy="9694937"/>
+            <a:off x="14264640" y="15648831"/>
+            <a:ext cx="11704320" cy="7540502"/>
           </a:xfrm>
           <a:prstGeom prst="rect">
             <a:avLst/>
@@ -6873,79 +7309,35 @@
           <a:p>
             <a:pPr eaLnBrk="1" hangingPunct="1"/>
             <a:r>
-              <a:rPr lang="en-US" sz="3200" dirty="0">
+              <a:rPr lang="en-US" sz="2600" dirty="0">
                 <a:latin typeface="Avenir Book" panose="02000503020000020003" pitchFamily="2" charset="0"/>
                 <a:ea typeface="Cambria Math" panose="02040503050406030204" pitchFamily="18" charset="0"/>
               </a:rPr>
-              <a:t>Click here to insert your Results text. Type it in or copy and paste from your Word document or other source.</a:t>
-            </a:r>
-          </a:p>
-          <a:p>
-            <a:pPr eaLnBrk="1" hangingPunct="1"/>
-            <a:endParaRPr lang="en-US" sz="3200" dirty="0">
-              <a:latin typeface="Avenir Book" panose="02000503020000020003" pitchFamily="2" charset="0"/>
-              <a:ea typeface="Cambria Math" panose="02040503050406030204" pitchFamily="18" charset="0"/>
-            </a:endParaRPr>
-          </a:p>
-          <a:p>
-            <a:pPr eaLnBrk="1" hangingPunct="1"/>
-            <a:r>
-              <a:rPr lang="en-US" sz="3200" dirty="0">
+              <a:t>In regards to the ATP rheostat model, we were able to show that ATP life extension can be achieved. First, we chose to implement an enzymatic mechanism by which every step of the pathway would follow, shown in Figure 3 below. After choosing parameters based on literature, we simulated the pathway by using BioCRNpyler, bioscrape, and </a:t>
+            </a:r>
+            <a:r>
+              <a:rPr lang="en-US" sz="2600" dirty="0" err="1">
                 <a:latin typeface="Avenir Book" panose="02000503020000020003" pitchFamily="2" charset="0"/>
                 <a:ea typeface="Cambria Math" panose="02040503050406030204" pitchFamily="18" charset="0"/>
               </a:rPr>
-              <a:t>This text box will automatically re-size to your text. To turn off that feature, right click inside this box and go to Format Shape, Text Box, Autofit, and select the “Do Not Autofit” radio button.</a:t>
-            </a:r>
-          </a:p>
-          <a:p>
-            <a:pPr eaLnBrk="1" hangingPunct="1"/>
-            <a:endParaRPr lang="en-US" sz="3200" dirty="0">
-              <a:latin typeface="Avenir Book" panose="02000503020000020003" pitchFamily="2" charset="0"/>
-              <a:ea typeface="Cambria Math" panose="02040503050406030204" pitchFamily="18" charset="0"/>
-            </a:endParaRPr>
-          </a:p>
-          <a:p>
-            <a:pPr eaLnBrk="1" hangingPunct="1"/>
-            <a:r>
-              <a:rPr lang="en-US" sz="3200" dirty="0">
+              <a:t>sbml</a:t>
+            </a:r>
+            <a:r>
+              <a:rPr lang="en-US" sz="2600" dirty="0">
                 <a:latin typeface="Avenir Book" panose="02000503020000020003" pitchFamily="2" charset="0"/>
                 <a:ea typeface="Cambria Math" panose="02040503050406030204" pitchFamily="18" charset="0"/>
               </a:rPr>
-              <a:t>To change the font style of this text box: Click on the border once to highlight the entire text box, then select a different font or font size that suits you. This text is Calibri 32pt and is easily read up to 5 feet away on a 44x44 poster.</a:t>
+              <a:t>. The simulations are shown in Figure 4 below. We can see that there is isobutanol production and glucose consumption, as expected (Fig 4a). There is also extended ATP lifetime when the rheostat is implemented compared to when we only model ATP hydrolysis (Fig 4b). The ATP use case is included in all simulations to represent ATP consumed by TX/TL.</a:t>
             </a:r>
           </a:p>
           <a:p>
             <a:pPr eaLnBrk="1" hangingPunct="1"/>
-            <a:endParaRPr lang="en-US" sz="3200" dirty="0">
-              <a:latin typeface="Avenir Book" panose="02000503020000020003" pitchFamily="2" charset="0"/>
-              <a:ea typeface="Cambria Math" panose="02040503050406030204" pitchFamily="18" charset="0"/>
-            </a:endParaRPr>
-          </a:p>
-          <a:p>
-            <a:pPr eaLnBrk="1" hangingPunct="1"/>
-            <a:r>
-              <a:rPr lang="en-US" sz="3200" dirty="0">
+            <a:r>
+              <a:rPr lang="en-US" sz="2600" dirty="0">
                 <a:latin typeface="Avenir Book" panose="02000503020000020003" pitchFamily="2" charset="0"/>
                 <a:ea typeface="Cambria Math" panose="02040503050406030204" pitchFamily="18" charset="0"/>
               </a:rPr>
-              <a:t>Zoom out to 100% to preview what this will look like on your printed poster.</a:t>
-            </a:r>
-          </a:p>
-          <a:p>
-            <a:pPr eaLnBrk="1" hangingPunct="1"/>
-            <a:endParaRPr lang="en-US" sz="3200" dirty="0">
-              <a:latin typeface="Avenir Book" panose="02000503020000020003" pitchFamily="2" charset="0"/>
-              <a:ea typeface="Cambria Math" panose="02040503050406030204" pitchFamily="18" charset="0"/>
-            </a:endParaRPr>
-          </a:p>
-          <a:p>
-            <a:pPr eaLnBrk="1" hangingPunct="1"/>
-            <a:r>
-              <a:rPr lang="en-US" sz="3200" dirty="0">
-                <a:latin typeface="Avenir Book" panose="02000503020000020003" pitchFamily="2" charset="0"/>
-                <a:ea typeface="Cambria Math" panose="02040503050406030204" pitchFamily="18" charset="0"/>
-              </a:rPr>
-              <a:t>Speaking of Results, yours will look better if you remember to run a spell-check on your poster! After you’ve added your content click on Review, Spelling, or press F7.</a:t>
+              <a:t>We are also able to show ATP life extension via the ATP synthase model. The three main components of this model are ATP synthesis via ATP synthase, proton gradient maintenance via a proton pump, and ATP use (that is representative of ATP consumed by TX/TL). When we compare the simulation with ATP synthase + ATP use vs ATP use only (Fig 5a), we see that there is a very short ATP life extension event. Then, when we include the proton pump, ATP is completely regenerated and can reach a higher steady state (Fig 5b). </a:t>
             </a:r>
           </a:p>
         </p:txBody>
@@ -6958,7 +7350,7 @@
         </p:nvSpPr>
         <p:spPr>
           <a:xfrm>
-            <a:off x="1645920" y="15453360"/>
+            <a:off x="1645920" y="14820536"/>
             <a:ext cx="11704320" cy="822960"/>
           </a:xfrm>
           <a:prstGeom prst="rect">
@@ -7156,7 +7548,7 @@
               <a:rPr lang="en-US" sz="2600" dirty="0">
                 <a:latin typeface="Avenir Book" panose="02000503020000020003" pitchFamily="2" charset="0"/>
               </a:rPr>
-              <a:t> In particular we used BioCRNpyler, bioscrape, autoReduce, SBML, and sub-</a:t>
+              <a:t> In particular, we used BioCRNpyler, bioscrape, autoReduce, SBML, and sub-</a:t>
             </a:r>
             <a:r>
               <a:rPr lang="en-US" sz="2600" dirty="0" err="1">
@@ -7168,19 +7560,7 @@
               <a:rPr lang="en-US" sz="2600" dirty="0">
                 <a:latin typeface="Avenir Book" panose="02000503020000020003" pitchFamily="2" charset="0"/>
               </a:rPr>
-              <a:t>. Various software packages, such as </a:t>
-            </a:r>
-            <a:r>
-              <a:rPr lang="en-US" sz="2600" dirty="0" err="1">
-                <a:latin typeface="Avenir Book" panose="02000503020000020003" pitchFamily="2" charset="0"/>
-              </a:rPr>
-              <a:t>BioCRNPyler</a:t>
-            </a:r>
-            <a:r>
-              <a:rPr lang="en-US" sz="2600" dirty="0">
-                <a:latin typeface="Avenir Book" panose="02000503020000020003" pitchFamily="2" charset="0"/>
-              </a:rPr>
-              <a:t>, bioscrape, and autoReduce are being actively developed by members of Murray Lab. Biocrnpyler is an object oriented framework (written in Python). Given simple descriptions, the software can generate chemical reaction networks, or CRNs. These are outputted as SBML files. SBML is a model representation format, which uses the language XML and commonly used in systems and synthetic biology. We then used bioscrape as a CRN simulator. Given an SBML file, bioscrape can solve the system and returns an output of results that can be simply visualized. Sub-</a:t>
+              <a:t>. Various software packages, such as BioCRNpyler, bioscrape, and autoReduce are being actively developed by members of Murray Lab. Biocrnpyler is an object-oriented framework (written in Python). Given simple descriptions, the software can generate chemical reaction networks, or CRNs. These are outputted as SBML files. SBML is a model representation format, which uses the language XML and commonly used in systems and synthetic biology. We then used bioscrape as a CRN simulator. Given an SBML file, bioscrape can solve the system and returns an output of results that can be simply visualized. Sub-</a:t>
             </a:r>
             <a:r>
               <a:rPr lang="en-US" sz="2600" dirty="0" err="1">
@@ -7305,8 +7685,8 @@
         </p:nvSpPr>
         <p:spPr bwMode="auto">
           <a:xfrm>
-            <a:off x="26883360" y="16276320"/>
-            <a:ext cx="11704320" cy="7725167"/>
+            <a:off x="26883360" y="15643296"/>
+            <a:ext cx="11704320" cy="6247840"/>
           </a:xfrm>
           <a:prstGeom prst="rect">
             <a:avLst/>
@@ -7432,58 +7812,49 @@
                 <a:latin typeface="Avenir Book" panose="02000503020000020003" pitchFamily="2" charset="0"/>
                 <a:ea typeface="Cambria Math" panose="02040503050406030204" pitchFamily="18" charset="0"/>
               </a:rPr>
-              <a:t>Click here to insert your Discussion text. Type it in or copy and paste from your Word document or other source.</a:t>
-            </a:r>
-          </a:p>
-          <a:p>
-            <a:pPr eaLnBrk="1" hangingPunct="1"/>
-            <a:endParaRPr lang="en-US" sz="3200" dirty="0">
-              <a:latin typeface="Avenir Book" panose="02000503020000020003" pitchFamily="2" charset="0"/>
-              <a:ea typeface="Cambria Math" panose="02040503050406030204" pitchFamily="18" charset="0"/>
-            </a:endParaRPr>
-          </a:p>
-          <a:p>
-            <a:pPr eaLnBrk="1" hangingPunct="1"/>
+              <a:t>It is important to combine these models with others, such as ssDNA export or liposome fusion models, to understand and confirm the effects ATP life extension may have. This was done with </a:t>
+            </a:r>
+            <a:r>
+              <a:rPr lang="en-US" sz="3200" dirty="0" err="1">
+                <a:latin typeface="Avenir Book" panose="02000503020000020003" pitchFamily="2" charset="0"/>
+                <a:ea typeface="Cambria Math" panose="02040503050406030204" pitchFamily="18" charset="0"/>
+              </a:rPr>
+              <a:t>Agrima</a:t>
+            </a:r>
             <a:r>
               <a:rPr lang="en-US" sz="3200" dirty="0">
                 <a:latin typeface="Avenir Book" panose="02000503020000020003" pitchFamily="2" charset="0"/>
                 <a:ea typeface="Cambria Math" panose="02040503050406030204" pitchFamily="18" charset="0"/>
               </a:rPr>
-              <a:t>This text box will automatically re-size to your text. To turn off that feature, right click inside this box and go to Format Shape, Text Box, Autofit, and select the “Do Not Autofit” radio button.</a:t>
-            </a:r>
-          </a:p>
-          <a:p>
-            <a:pPr eaLnBrk="1" hangingPunct="1"/>
-            <a:endParaRPr lang="en-US" sz="3200" dirty="0">
-              <a:latin typeface="Avenir Book" panose="02000503020000020003" pitchFamily="2" charset="0"/>
-              <a:ea typeface="Cambria Math" panose="02040503050406030204" pitchFamily="18" charset="0"/>
-            </a:endParaRPr>
-          </a:p>
-          <a:p>
-            <a:pPr eaLnBrk="1" hangingPunct="1"/>
+              <a:t> </a:t>
+            </a:r>
+            <a:r>
+              <a:rPr lang="en-US" sz="3200" dirty="0" err="1">
+                <a:latin typeface="Avenir Book" panose="02000503020000020003" pitchFamily="2" charset="0"/>
+                <a:ea typeface="Cambria Math" panose="02040503050406030204" pitchFamily="18" charset="0"/>
+              </a:rPr>
+              <a:t>Deedwania’s</a:t>
+            </a:r>
             <a:r>
               <a:rPr lang="en-US" sz="3200" dirty="0">
                 <a:latin typeface="Avenir Book" panose="02000503020000020003" pitchFamily="2" charset="0"/>
                 <a:ea typeface="Cambria Math" panose="02040503050406030204" pitchFamily="18" charset="0"/>
               </a:rPr>
-              <a:t>To change the font style of this text box: Click on the border once to highlight the entire text box, then select a different font or font size that suits you. This text is Calibri 32pt and is easily read up to 5 feet away on a 44x44 poster.</a:t>
-            </a:r>
-          </a:p>
-          <a:p>
-            <a:pPr eaLnBrk="1" hangingPunct="1"/>
-            <a:endParaRPr lang="en-US" sz="3200" dirty="0">
-              <a:latin typeface="Avenir Book" panose="02000503020000020003" pitchFamily="2" charset="0"/>
-              <a:ea typeface="Cambria Math" panose="02040503050406030204" pitchFamily="18" charset="0"/>
-            </a:endParaRPr>
-          </a:p>
-          <a:p>
-            <a:pPr eaLnBrk="1" hangingPunct="1"/>
+              <a:t> (IIT Delhi) single-stranded DNA (ssDNA) export model. Her model included the integration of a membrane protein (VirE2) by which ssDNA could be exported. We can see that when the ATP rheostat model is combined with the export model, there is more bound VirE2 and faster ssDNA export. We notice more significant effects when combined with the ATP synthase model since the self-sufficient capability of </a:t>
+            </a:r>
+            <a:r>
+              <a:rPr lang="en-US" sz="3200">
+                <a:latin typeface="Avenir Book" panose="02000503020000020003" pitchFamily="2" charset="0"/>
+                <a:ea typeface="Cambria Math" panose="02040503050406030204" pitchFamily="18" charset="0"/>
+              </a:rPr>
+              <a:t>this model ensure </a:t>
+            </a:r>
             <a:r>
               <a:rPr lang="en-US" sz="3200" dirty="0">
                 <a:latin typeface="Avenir Book" panose="02000503020000020003" pitchFamily="2" charset="0"/>
                 <a:ea typeface="Cambria Math" panose="02040503050406030204" pitchFamily="18" charset="0"/>
               </a:rPr>
-              <a:t>Zoom out to 100% to preview what this will look like on your printed poster.</a:t>
+              <a:t>a longer timeline of ATP life extension.</a:t>
             </a:r>
           </a:p>
         </p:txBody>
@@ -7496,7 +7867,7 @@
         </p:nvSpPr>
         <p:spPr>
           <a:xfrm>
-            <a:off x="26883360" y="15453360"/>
+            <a:off x="26883360" y="14820336"/>
             <a:ext cx="11704320" cy="822960"/>
           </a:xfrm>
           <a:prstGeom prst="rect">
@@ -7797,976 +8168,165 @@
           </a:p>
         </p:txBody>
       </p:sp>
-      <p:graphicFrame>
-        <p:nvGraphicFramePr>
-          <p:cNvPr id="44" name="Content Placeholder 114" descr="Sample table with 4 columns, 7 rows." title="Sample Table"/>
-          <p:cNvGraphicFramePr>
-            <a:graphicFrameLocks/>
-          </p:cNvGraphicFramePr>
-          <p:nvPr>
-            <p:extLst>
-              <p:ext uri="{D42A27DB-BD31-4B8C-83A1-F6EECF244321}">
-                <p14:modId xmlns:p14="http://schemas.microsoft.com/office/powerpoint/2010/main" val="194700409"/>
-              </p:ext>
-            </p:extLst>
-          </p:nvPr>
-        </p:nvGraphicFramePr>
-        <p:xfrm>
-          <a:off x="14328008" y="27647612"/>
-          <a:ext cx="11732392" cy="6648740"/>
-        </p:xfrm>
-        <a:graphic>
-          <a:graphicData uri="http://schemas.openxmlformats.org/drawingml/2006/table">
-            <a:tbl>
-              <a:tblPr firstRow="1" bandRow="1">
-                <a:tableStyleId>{F5AB1C69-6EDB-4FF4-983F-18BD219EF322}</a:tableStyleId>
-              </a:tblPr>
-              <a:tblGrid>
-                <a:gridCol w="2933098">
-                  <a:extLst>
-                    <a:ext uri="{9D8B030D-6E8A-4147-A177-3AD203B41FA5}">
-                      <a16:colId xmlns:a16="http://schemas.microsoft.com/office/drawing/2014/main" val="20000"/>
-                    </a:ext>
-                  </a:extLst>
-                </a:gridCol>
-                <a:gridCol w="2933098">
-                  <a:extLst>
-                    <a:ext uri="{9D8B030D-6E8A-4147-A177-3AD203B41FA5}">
-                      <a16:colId xmlns:a16="http://schemas.microsoft.com/office/drawing/2014/main" val="20001"/>
-                    </a:ext>
-                  </a:extLst>
-                </a:gridCol>
-                <a:gridCol w="2933098">
-                  <a:extLst>
-                    <a:ext uri="{9D8B030D-6E8A-4147-A177-3AD203B41FA5}">
-                      <a16:colId xmlns:a16="http://schemas.microsoft.com/office/drawing/2014/main" val="20002"/>
-                    </a:ext>
-                  </a:extLst>
-                </a:gridCol>
-                <a:gridCol w="2933098">
-                  <a:extLst>
-                    <a:ext uri="{9D8B030D-6E8A-4147-A177-3AD203B41FA5}">
-                      <a16:colId xmlns:a16="http://schemas.microsoft.com/office/drawing/2014/main" val="20003"/>
-                    </a:ext>
-                  </a:extLst>
-                </a:gridCol>
-              </a:tblGrid>
-              <a:tr h="949820">
-                <a:tc>
-                  <a:txBody>
-                    <a:bodyPr/>
-                    <a:lstStyle/>
-                    <a:p>
-                      <a:endParaRPr lang="en-US" sz="3200" dirty="0"/>
-                    </a:p>
-                  </a:txBody>
-                  <a:tcPr marL="111760" marR="111760" marT="41910" marB="41910" anchor="ctr">
-                    <a:solidFill>
-                      <a:schemeClr val="accent1">
-                        <a:lumMod val="75000"/>
-                      </a:schemeClr>
-                    </a:solidFill>
-                  </a:tcPr>
-                </a:tc>
-                <a:tc>
-                  <a:txBody>
-                    <a:bodyPr/>
-                    <a:lstStyle/>
-                    <a:p>
-                      <a:pPr algn="ctr"/>
-                      <a:r>
-                        <a:rPr lang="en-US" sz="3200" dirty="0"/>
-                        <a:t>Heading</a:t>
-                      </a:r>
-                    </a:p>
-                  </a:txBody>
-                  <a:tcPr marL="111760" marR="111760" marT="41910" marB="41910" anchor="ctr">
-                    <a:solidFill>
-                      <a:schemeClr val="accent1">
-                        <a:lumMod val="75000"/>
-                      </a:schemeClr>
-                    </a:solidFill>
-                  </a:tcPr>
-                </a:tc>
-                <a:tc>
-                  <a:txBody>
-                    <a:bodyPr/>
-                    <a:lstStyle/>
-                    <a:p>
-                      <a:pPr algn="ctr"/>
-                      <a:r>
-                        <a:rPr lang="en-US" sz="3200" dirty="0"/>
-                        <a:t>Heading</a:t>
-                      </a:r>
-                    </a:p>
-                  </a:txBody>
-                  <a:tcPr marL="111760" marR="111760" marT="41910" marB="41910" anchor="ctr">
-                    <a:solidFill>
-                      <a:schemeClr val="accent1">
-                        <a:lumMod val="75000"/>
-                      </a:schemeClr>
-                    </a:solidFill>
-                  </a:tcPr>
-                </a:tc>
-                <a:tc>
-                  <a:txBody>
-                    <a:bodyPr/>
-                    <a:lstStyle/>
-                    <a:p>
-                      <a:pPr algn="ctr"/>
-                      <a:r>
-                        <a:rPr lang="en-US" sz="3200" dirty="0"/>
-                        <a:t>Heading</a:t>
-                      </a:r>
-                    </a:p>
-                  </a:txBody>
-                  <a:tcPr marL="111760" marR="111760" marT="41910" marB="41910" anchor="ctr">
-                    <a:solidFill>
-                      <a:schemeClr val="accent1">
-                        <a:lumMod val="75000"/>
-                      </a:schemeClr>
-                    </a:solidFill>
-                  </a:tcPr>
-                </a:tc>
-                <a:extLst>
-                  <a:ext uri="{0D108BD9-81ED-4DB2-BD59-A6C34878D82A}">
-                    <a16:rowId xmlns:a16="http://schemas.microsoft.com/office/drawing/2014/main" val="10000"/>
-                  </a:ext>
-                </a:extLst>
-              </a:tr>
-              <a:tr h="949820">
-                <a:tc>
-                  <a:txBody>
-                    <a:bodyPr/>
-                    <a:lstStyle/>
-                    <a:p>
-                      <a:r>
-                        <a:rPr lang="en-US" sz="3200" dirty="0"/>
-                        <a:t>Item</a:t>
-                      </a:r>
-                    </a:p>
-                  </a:txBody>
-                  <a:tcPr marL="111760" marR="111760" marT="41910" marB="41910" anchor="ctr"/>
-                </a:tc>
-                <a:tc>
-                  <a:txBody>
-                    <a:bodyPr/>
-                    <a:lstStyle/>
-                    <a:p>
-                      <a:pPr algn="ctr"/>
-                      <a:r>
-                        <a:rPr lang="en-US" sz="3200" dirty="0"/>
-                        <a:t>800</a:t>
-                      </a:r>
-                    </a:p>
-                  </a:txBody>
-                  <a:tcPr marL="111760" marR="111760" marT="41910" marB="41910" anchor="ctr"/>
-                </a:tc>
-                <a:tc>
-                  <a:txBody>
-                    <a:bodyPr/>
-                    <a:lstStyle/>
-                    <a:p>
-                      <a:pPr algn="ctr"/>
-                      <a:r>
-                        <a:rPr lang="en-US" sz="3200" dirty="0"/>
-                        <a:t>790</a:t>
-                      </a:r>
-                    </a:p>
-                  </a:txBody>
-                  <a:tcPr marL="111760" marR="111760" marT="41910" marB="41910" anchor="ctr"/>
-                </a:tc>
-                <a:tc>
-                  <a:txBody>
-                    <a:bodyPr/>
-                    <a:lstStyle/>
-                    <a:p>
-                      <a:pPr algn="ctr"/>
-                      <a:r>
-                        <a:rPr lang="en-US" sz="3200" dirty="0"/>
-                        <a:t>4001</a:t>
-                      </a:r>
-                    </a:p>
-                  </a:txBody>
-                  <a:tcPr marL="111760" marR="111760" marT="41910" marB="41910" anchor="ctr"/>
-                </a:tc>
-                <a:extLst>
-                  <a:ext uri="{0D108BD9-81ED-4DB2-BD59-A6C34878D82A}">
-                    <a16:rowId xmlns:a16="http://schemas.microsoft.com/office/drawing/2014/main" val="10001"/>
-                  </a:ext>
-                </a:extLst>
-              </a:tr>
-              <a:tr h="949820">
-                <a:tc>
-                  <a:txBody>
-                    <a:bodyPr/>
-                    <a:lstStyle/>
-                    <a:p>
-                      <a:r>
-                        <a:rPr lang="en-US" sz="3200" dirty="0"/>
-                        <a:t>Item</a:t>
-                      </a:r>
-                    </a:p>
-                  </a:txBody>
-                  <a:tcPr marL="111760" marR="111760" marT="41910" marB="41910" anchor="ctr"/>
-                </a:tc>
-                <a:tc>
-                  <a:txBody>
-                    <a:bodyPr/>
-                    <a:lstStyle/>
-                    <a:p>
-                      <a:pPr algn="ctr"/>
-                      <a:r>
-                        <a:rPr lang="en-US" sz="3200" dirty="0"/>
-                        <a:t>356</a:t>
-                      </a:r>
-                    </a:p>
-                  </a:txBody>
-                  <a:tcPr marL="111760" marR="111760" marT="41910" marB="41910" anchor="ctr"/>
-                </a:tc>
-                <a:tc>
-                  <a:txBody>
-                    <a:bodyPr/>
-                    <a:lstStyle/>
-                    <a:p>
-                      <a:pPr algn="ctr"/>
-                      <a:r>
-                        <a:rPr lang="en-US" sz="3200" dirty="0"/>
-                        <a:t>856</a:t>
-                      </a:r>
-                    </a:p>
-                  </a:txBody>
-                  <a:tcPr marL="111760" marR="111760" marT="41910" marB="41910" anchor="ctr"/>
-                </a:tc>
-                <a:tc>
-                  <a:txBody>
-                    <a:bodyPr/>
-                    <a:lstStyle/>
-                    <a:p>
-                      <a:pPr algn="ctr"/>
-                      <a:r>
-                        <a:rPr lang="en-US" sz="3200" dirty="0"/>
-                        <a:t>290</a:t>
-                      </a:r>
-                    </a:p>
-                  </a:txBody>
-                  <a:tcPr marL="111760" marR="111760" marT="41910" marB="41910" anchor="ctr"/>
-                </a:tc>
-                <a:extLst>
-                  <a:ext uri="{0D108BD9-81ED-4DB2-BD59-A6C34878D82A}">
-                    <a16:rowId xmlns:a16="http://schemas.microsoft.com/office/drawing/2014/main" val="10002"/>
-                  </a:ext>
-                </a:extLst>
-              </a:tr>
-              <a:tr h="949820">
-                <a:tc>
-                  <a:txBody>
-                    <a:bodyPr/>
-                    <a:lstStyle/>
-                    <a:p>
-                      <a:r>
-                        <a:rPr lang="en-US" sz="3200" dirty="0"/>
-                        <a:t>Item</a:t>
-                      </a:r>
-                    </a:p>
-                  </a:txBody>
-                  <a:tcPr marL="111760" marR="111760" marT="41910" marB="41910" anchor="ctr"/>
-                </a:tc>
-                <a:tc>
-                  <a:txBody>
-                    <a:bodyPr/>
-                    <a:lstStyle/>
-                    <a:p>
-                      <a:pPr algn="ctr"/>
-                      <a:r>
-                        <a:rPr lang="en-US" sz="3200" dirty="0"/>
-                        <a:t>228</a:t>
-                      </a:r>
-                    </a:p>
-                  </a:txBody>
-                  <a:tcPr marL="111760" marR="111760" marT="41910" marB="41910" anchor="ctr"/>
-                </a:tc>
-                <a:tc>
-                  <a:txBody>
-                    <a:bodyPr/>
-                    <a:lstStyle/>
-                    <a:p>
-                      <a:pPr algn="ctr"/>
-                      <a:r>
-                        <a:rPr lang="en-US" sz="3200" dirty="0"/>
-                        <a:t>134</a:t>
-                      </a:r>
-                    </a:p>
-                  </a:txBody>
-                  <a:tcPr marL="111760" marR="111760" marT="41910" marB="41910" anchor="ctr"/>
-                </a:tc>
-                <a:tc>
-                  <a:txBody>
-                    <a:bodyPr/>
-                    <a:lstStyle/>
-                    <a:p>
-                      <a:pPr algn="ctr"/>
-                      <a:r>
-                        <a:rPr lang="en-US" sz="3200" dirty="0"/>
-                        <a:t>238</a:t>
-                      </a:r>
-                    </a:p>
-                  </a:txBody>
-                  <a:tcPr marL="111760" marR="111760" marT="41910" marB="41910" anchor="ctr"/>
-                </a:tc>
-                <a:extLst>
-                  <a:ext uri="{0D108BD9-81ED-4DB2-BD59-A6C34878D82A}">
-                    <a16:rowId xmlns:a16="http://schemas.microsoft.com/office/drawing/2014/main" val="10003"/>
-                  </a:ext>
-                </a:extLst>
-              </a:tr>
-              <a:tr h="949820">
-                <a:tc>
-                  <a:txBody>
-                    <a:bodyPr/>
-                    <a:lstStyle/>
-                    <a:p>
-                      <a:r>
-                        <a:rPr lang="en-US" sz="3200" dirty="0"/>
-                        <a:t>Item</a:t>
-                      </a:r>
-                    </a:p>
-                  </a:txBody>
-                  <a:tcPr marL="111760" marR="111760" marT="41910" marB="41910" anchor="ctr"/>
-                </a:tc>
-                <a:tc>
-                  <a:txBody>
-                    <a:bodyPr/>
-                    <a:lstStyle/>
-                    <a:p>
-                      <a:pPr algn="ctr"/>
-                      <a:r>
-                        <a:rPr lang="en-US" sz="3200" dirty="0"/>
-                        <a:t>954</a:t>
-                      </a:r>
-                    </a:p>
-                  </a:txBody>
-                  <a:tcPr marL="111760" marR="111760" marT="41910" marB="41910" anchor="ctr"/>
-                </a:tc>
-                <a:tc>
-                  <a:txBody>
-                    <a:bodyPr/>
-                    <a:lstStyle/>
-                    <a:p>
-                      <a:pPr algn="ctr"/>
-                      <a:r>
-                        <a:rPr lang="en-US" sz="3200" dirty="0"/>
-                        <a:t>875</a:t>
-                      </a:r>
-                    </a:p>
-                  </a:txBody>
-                  <a:tcPr marL="111760" marR="111760" marT="41910" marB="41910" anchor="ctr"/>
-                </a:tc>
-                <a:tc>
-                  <a:txBody>
-                    <a:bodyPr/>
-                    <a:lstStyle/>
-                    <a:p>
-                      <a:pPr algn="ctr"/>
-                      <a:r>
-                        <a:rPr lang="en-US" sz="3200" dirty="0"/>
-                        <a:t>976</a:t>
-                      </a:r>
-                    </a:p>
-                  </a:txBody>
-                  <a:tcPr marL="111760" marR="111760" marT="41910" marB="41910" anchor="ctr"/>
-                </a:tc>
-                <a:extLst>
-                  <a:ext uri="{0D108BD9-81ED-4DB2-BD59-A6C34878D82A}">
-                    <a16:rowId xmlns:a16="http://schemas.microsoft.com/office/drawing/2014/main" val="10004"/>
-                  </a:ext>
-                </a:extLst>
-              </a:tr>
-              <a:tr h="949820">
-                <a:tc>
-                  <a:txBody>
-                    <a:bodyPr/>
-                    <a:lstStyle/>
-                    <a:p>
-                      <a:r>
-                        <a:rPr lang="en-US" sz="3200" dirty="0"/>
-                        <a:t>Item</a:t>
-                      </a:r>
-                    </a:p>
-                  </a:txBody>
-                  <a:tcPr marL="111760" marR="111760" marT="41910" marB="41910" anchor="ctr"/>
-                </a:tc>
-                <a:tc>
-                  <a:txBody>
-                    <a:bodyPr/>
-                    <a:lstStyle/>
-                    <a:p>
-                      <a:pPr algn="ctr"/>
-                      <a:r>
-                        <a:rPr lang="en-US" sz="3200" dirty="0"/>
-                        <a:t>324</a:t>
-                      </a:r>
-                    </a:p>
-                  </a:txBody>
-                  <a:tcPr marL="111760" marR="111760" marT="41910" marB="41910" anchor="ctr"/>
-                </a:tc>
-                <a:tc>
-                  <a:txBody>
-                    <a:bodyPr/>
-                    <a:lstStyle/>
-                    <a:p>
-                      <a:pPr algn="ctr"/>
-                      <a:r>
-                        <a:rPr lang="en-US" sz="3200" dirty="0"/>
-                        <a:t>325</a:t>
-                      </a:r>
-                    </a:p>
-                  </a:txBody>
-                  <a:tcPr marL="111760" marR="111760" marT="41910" marB="41910" anchor="ctr"/>
-                </a:tc>
-                <a:tc>
-                  <a:txBody>
-                    <a:bodyPr/>
-                    <a:lstStyle/>
-                    <a:p>
-                      <a:pPr algn="ctr"/>
-                      <a:r>
-                        <a:rPr lang="en-US" sz="3200" dirty="0"/>
-                        <a:t>301</a:t>
-                      </a:r>
-                    </a:p>
-                  </a:txBody>
-                  <a:tcPr marL="111760" marR="111760" marT="41910" marB="41910" anchor="ctr"/>
-                </a:tc>
-                <a:extLst>
-                  <a:ext uri="{0D108BD9-81ED-4DB2-BD59-A6C34878D82A}">
-                    <a16:rowId xmlns:a16="http://schemas.microsoft.com/office/drawing/2014/main" val="10005"/>
-                  </a:ext>
-                </a:extLst>
-              </a:tr>
-              <a:tr h="949820">
-                <a:tc>
-                  <a:txBody>
-                    <a:bodyPr/>
-                    <a:lstStyle/>
-                    <a:p>
-                      <a:r>
-                        <a:rPr lang="en-US" sz="3200" b="1" dirty="0"/>
-                        <a:t>Total</a:t>
-                      </a:r>
-                    </a:p>
-                  </a:txBody>
-                  <a:tcPr marL="111760" marR="111760" marT="41910" marB="41910" anchor="ctr"/>
-                </a:tc>
-                <a:tc>
-                  <a:txBody>
-                    <a:bodyPr/>
-                    <a:lstStyle/>
-                    <a:p>
-                      <a:pPr algn="ctr"/>
-                      <a:r>
-                        <a:rPr lang="en-US" sz="3200" b="1" dirty="0"/>
-                        <a:t>199</a:t>
-                      </a:r>
-                    </a:p>
-                  </a:txBody>
-                  <a:tcPr marL="111760" marR="111760" marT="41910" marB="41910" anchor="ctr"/>
-                </a:tc>
-                <a:tc>
-                  <a:txBody>
-                    <a:bodyPr/>
-                    <a:lstStyle/>
-                    <a:p>
-                      <a:pPr algn="ctr"/>
-                      <a:r>
-                        <a:rPr lang="en-US" sz="3200" b="1" dirty="0"/>
-                        <a:t>137</a:t>
-                      </a:r>
-                    </a:p>
-                  </a:txBody>
-                  <a:tcPr marL="111760" marR="111760" marT="41910" marB="41910" anchor="ctr"/>
-                </a:tc>
-                <a:tc>
-                  <a:txBody>
-                    <a:bodyPr/>
-                    <a:lstStyle/>
-                    <a:p>
-                      <a:pPr algn="ctr"/>
-                      <a:r>
-                        <a:rPr lang="en-US" sz="3200" b="1" dirty="0"/>
-                        <a:t>186</a:t>
-                      </a:r>
-                    </a:p>
-                  </a:txBody>
-                  <a:tcPr marL="111760" marR="111760" marT="41910" marB="41910" anchor="ctr"/>
-                </a:tc>
-                <a:extLst>
-                  <a:ext uri="{0D108BD9-81ED-4DB2-BD59-A6C34878D82A}">
-                    <a16:rowId xmlns:a16="http://schemas.microsoft.com/office/drawing/2014/main" val="10006"/>
-                  </a:ext>
-                </a:extLst>
-              </a:tr>
-            </a:tbl>
-          </a:graphicData>
-        </a:graphic>
-      </p:graphicFrame>
-      <mc:AlternateContent xmlns:mc="http://schemas.openxmlformats.org/markup-compatibility/2006" xmlns:a14="http://schemas.microsoft.com/office/drawing/2010/main">
-        <mc:Choice Requires="a14">
-          <p:sp>
-            <p:nvSpPr>
-              <p:cNvPr id="11" name="Text Box 190"/>
-              <p:cNvSpPr txBox="1">
-                <a:spLocks noChangeArrowheads="1"/>
-              </p:cNvSpPr>
-              <p:nvPr/>
-            </p:nvSpPr>
-            <p:spPr bwMode="auto">
-              <a:xfrm>
-                <a:off x="1645920" y="16276320"/>
-                <a:ext cx="11704320" cy="13175506"/>
-              </a:xfrm>
-              <a:prstGeom prst="rect">
-                <a:avLst/>
-              </a:prstGeom>
-              <a:solidFill>
-                <a:schemeClr val="bg1"/>
-              </a:solidFill>
-              <a:ln w="12700">
-                <a:solidFill>
-                  <a:schemeClr val="accent1">
-                    <a:lumMod val="75000"/>
-                  </a:schemeClr>
-                </a:solidFill>
-              </a:ln>
-              <a:effectLst/>
-            </p:spPr>
-            <p:txBody>
-              <a:bodyPr lIns="167628" tIns="167628" rIns="167628" bIns="167628">
-                <a:spAutoFit/>
-              </a:bodyPr>
-              <a:lstStyle>
-                <a:lvl1pPr eaLnBrk="0" hangingPunct="0">
-                  <a:defRPr sz="2200">
-                    <a:solidFill>
-                      <a:schemeClr val="tx1"/>
-                    </a:solidFill>
-                    <a:latin typeface="Arial" charset="0"/>
-                  </a:defRPr>
-                </a:lvl1pPr>
-                <a:lvl2pPr marL="742950" indent="-285750" eaLnBrk="0" hangingPunct="0">
-                  <a:defRPr sz="2200">
-                    <a:solidFill>
-                      <a:schemeClr val="tx1"/>
-                    </a:solidFill>
-                    <a:latin typeface="Arial" charset="0"/>
-                  </a:defRPr>
-                </a:lvl2pPr>
-                <a:lvl3pPr marL="1143000" indent="-228600" eaLnBrk="0" hangingPunct="0">
-                  <a:defRPr sz="2200">
-                    <a:solidFill>
-                      <a:schemeClr val="tx1"/>
-                    </a:solidFill>
-                    <a:latin typeface="Arial" charset="0"/>
-                  </a:defRPr>
-                </a:lvl3pPr>
-                <a:lvl4pPr marL="1600200" indent="-228600" eaLnBrk="0" hangingPunct="0">
-                  <a:defRPr sz="2200">
-                    <a:solidFill>
-                      <a:schemeClr val="tx1"/>
-                    </a:solidFill>
-                    <a:latin typeface="Arial" charset="0"/>
-                  </a:defRPr>
-                </a:lvl4pPr>
-                <a:lvl5pPr marL="2057400" indent="-228600" eaLnBrk="0" hangingPunct="0">
-                  <a:defRPr sz="2200">
-                    <a:solidFill>
-                      <a:schemeClr val="tx1"/>
-                    </a:solidFill>
-                    <a:latin typeface="Arial" charset="0"/>
-                  </a:defRPr>
-                </a:lvl5pPr>
-                <a:lvl6pPr marL="2514600" indent="-228600" eaLnBrk="0" fontAlgn="base" hangingPunct="0">
-                  <a:spcBef>
-                    <a:spcPct val="0"/>
-                  </a:spcBef>
-                  <a:spcAft>
-                    <a:spcPct val="0"/>
-                  </a:spcAft>
-                  <a:defRPr sz="2200">
-                    <a:solidFill>
-                      <a:schemeClr val="tx1"/>
-                    </a:solidFill>
-                    <a:latin typeface="Arial" charset="0"/>
-                  </a:defRPr>
-                </a:lvl6pPr>
-                <a:lvl7pPr marL="2971800" indent="-228600" eaLnBrk="0" fontAlgn="base" hangingPunct="0">
-                  <a:spcBef>
-                    <a:spcPct val="0"/>
-                  </a:spcBef>
-                  <a:spcAft>
-                    <a:spcPct val="0"/>
-                  </a:spcAft>
-                  <a:defRPr sz="2200">
-                    <a:solidFill>
-                      <a:schemeClr val="tx1"/>
-                    </a:solidFill>
-                    <a:latin typeface="Arial" charset="0"/>
-                  </a:defRPr>
-                </a:lvl7pPr>
-                <a:lvl8pPr marL="3429000" indent="-228600" eaLnBrk="0" fontAlgn="base" hangingPunct="0">
-                  <a:spcBef>
-                    <a:spcPct val="0"/>
-                  </a:spcBef>
-                  <a:spcAft>
-                    <a:spcPct val="0"/>
-                  </a:spcAft>
-                  <a:defRPr sz="2200">
-                    <a:solidFill>
-                      <a:schemeClr val="tx1"/>
-                    </a:solidFill>
-                    <a:latin typeface="Arial" charset="0"/>
-                  </a:defRPr>
-                </a:lvl8pPr>
-                <a:lvl9pPr marL="3886200" indent="-228600" eaLnBrk="0" fontAlgn="base" hangingPunct="0">
-                  <a:spcBef>
-                    <a:spcPct val="0"/>
-                  </a:spcBef>
-                  <a:spcAft>
-                    <a:spcPct val="0"/>
-                  </a:spcAft>
-                  <a:defRPr sz="2200">
-                    <a:solidFill>
-                      <a:schemeClr val="tx1"/>
-                    </a:solidFill>
-                    <a:latin typeface="Arial" charset="0"/>
-                  </a:defRPr>
-                </a:lvl9pPr>
-              </a:lstStyle>
-              <a:p>
-                <a:pPr eaLnBrk="1" hangingPunct="1"/>
-                <a:r>
-                  <a:rPr lang="en-US" sz="3200" dirty="0">
-                    <a:latin typeface="Avenir Book" panose="02000503020000020003" pitchFamily="2" charset="0"/>
-                    <a:ea typeface="Cambria Math" panose="02040503050406030204" pitchFamily="18" charset="0"/>
-                  </a:rPr>
-                  <a:t>Genigraphics® has provided this template to assist in preparation of a medical or scientific research poster. The dimensions are set to 44” high by 44” wide but prints can be scaled up or down in size to any dimension with a 1:1 aspect ratio. For example, if you order a 40” x 40” poster using this template, we will print the file at 90.9% of its original size. The most critical factor is that your template and poster dimensions must be proportional:</a:t>
-                </a:r>
-              </a:p>
-              <a:p>
-                <a:pPr eaLnBrk="1" hangingPunct="1"/>
-                <a:endParaRPr lang="en-US" sz="3200" dirty="0">
-                  <a:latin typeface="Avenir Book" panose="02000503020000020003" pitchFamily="2" charset="0"/>
-                  <a:ea typeface="Cambria Math" panose="02040503050406030204" pitchFamily="18" charset="0"/>
-                </a:endParaRPr>
-              </a:p>
-              <a:p>
-                <a:pPr eaLnBrk="1" hangingPunct="1"/>
-                <a14:m>
-                  <m:oMathPara xmlns:m="http://schemas.openxmlformats.org/officeDocument/2006/math">
-                    <m:oMathParaPr>
-                      <m:jc m:val="centerGroup"/>
-                    </m:oMathParaPr>
-                    <m:oMath xmlns:m="http://schemas.openxmlformats.org/officeDocument/2006/math">
-                      <m:box>
-                        <m:boxPr>
-                          <m:ctrlPr>
-                            <a:rPr lang="en-US" sz="3200" i="1">
-                              <a:latin typeface="Cambria Math" panose="02040503050406030204" pitchFamily="18" charset="0"/>
-                              <a:ea typeface="Cambria Math" panose="02040503050406030204" pitchFamily="18" charset="0"/>
-                            </a:rPr>
-                          </m:ctrlPr>
-                        </m:boxPr>
-                        <m:e>
-                          <m:f>
-                            <m:fPr>
-                              <m:ctrlPr>
-                                <a:rPr lang="en-US" sz="3200" i="1">
-                                  <a:latin typeface="Cambria Math" panose="02040503050406030204" pitchFamily="18" charset="0"/>
-                                  <a:ea typeface="Cambria Math" panose="02040503050406030204" pitchFamily="18" charset="0"/>
-                                </a:rPr>
-                              </m:ctrlPr>
-                            </m:fPr>
-                            <m:num>
-                              <m:r>
-                                <m:rPr>
-                                  <m:sty m:val="p"/>
-                                </m:rPr>
-                                <a:rPr lang="en-US" sz="3200" b="0" i="0">
-                                  <a:latin typeface="Cambria Math" panose="02040503050406030204" pitchFamily="18" charset="0"/>
-                                  <a:ea typeface="Cambria Math" panose="02040503050406030204" pitchFamily="18" charset="0"/>
-                                </a:rPr>
-                                <m:t>template</m:t>
-                              </m:r>
-                              <m:r>
-                                <a:rPr lang="en-US" sz="3200" b="0" i="0">
-                                  <a:latin typeface="Cambria Math" panose="02040503050406030204" pitchFamily="18" charset="0"/>
-                                  <a:ea typeface="Cambria Math" panose="02040503050406030204" pitchFamily="18" charset="0"/>
-                                </a:rPr>
-                                <m:t> </m:t>
-                              </m:r>
-                              <m:r>
-                                <m:rPr>
-                                  <m:sty m:val="p"/>
-                                </m:rPr>
-                                <a:rPr lang="en-US" sz="3200" b="0" i="0">
-                                  <a:latin typeface="Cambria Math" panose="02040503050406030204" pitchFamily="18" charset="0"/>
-                                  <a:ea typeface="Cambria Math" panose="02040503050406030204" pitchFamily="18" charset="0"/>
-                                </a:rPr>
-                                <m:t>height</m:t>
-                              </m:r>
-                            </m:num>
-                            <m:den>
-                              <m:r>
-                                <m:rPr>
-                                  <m:sty m:val="p"/>
-                                </m:rPr>
-                                <a:rPr lang="en-US" sz="3200" b="0" i="0">
-                                  <a:latin typeface="Cambria Math" panose="02040503050406030204" pitchFamily="18" charset="0"/>
-                                  <a:ea typeface="Cambria Math" panose="02040503050406030204" pitchFamily="18" charset="0"/>
-                                </a:rPr>
-                                <m:t>template</m:t>
-                              </m:r>
-                              <m:r>
-                                <a:rPr lang="en-US" sz="3200" b="0" i="0">
-                                  <a:latin typeface="Cambria Math" panose="02040503050406030204" pitchFamily="18" charset="0"/>
-                                  <a:ea typeface="Cambria Math" panose="02040503050406030204" pitchFamily="18" charset="0"/>
-                                </a:rPr>
-                                <m:t> </m:t>
-                              </m:r>
-                              <m:r>
-                                <m:rPr>
-                                  <m:sty m:val="p"/>
-                                </m:rPr>
-                                <a:rPr lang="en-US" sz="3200" b="0" i="0">
-                                  <a:latin typeface="Cambria Math" panose="02040503050406030204" pitchFamily="18" charset="0"/>
-                                  <a:ea typeface="Cambria Math" panose="02040503050406030204" pitchFamily="18" charset="0"/>
-                                </a:rPr>
-                                <m:t>width</m:t>
-                              </m:r>
-                            </m:den>
-                          </m:f>
-                        </m:e>
-                      </m:box>
-                      <m:r>
-                        <a:rPr lang="en-US" sz="3200" b="0" i="0" smtClean="0">
-                          <a:latin typeface="Cambria Math" panose="02040503050406030204" pitchFamily="18" charset="0"/>
-                          <a:ea typeface="Cambria Math" panose="02040503050406030204" pitchFamily="18" charset="0"/>
-                        </a:rPr>
-                        <m:t> </m:t>
-                      </m:r>
-                      <m:r>
-                        <a:rPr lang="en-US" sz="3200" b="0" i="0">
-                          <a:latin typeface="Cambria Math" panose="02040503050406030204" pitchFamily="18" charset="0"/>
-                          <a:ea typeface="Cambria Math" panose="02040503050406030204" pitchFamily="18" charset="0"/>
-                        </a:rPr>
-                        <m:t>= </m:t>
-                      </m:r>
-                      <m:box>
-                        <m:boxPr>
-                          <m:ctrlPr>
-                            <a:rPr lang="en-US" sz="3200" i="1">
-                              <a:latin typeface="Cambria Math" panose="02040503050406030204" pitchFamily="18" charset="0"/>
-                              <a:ea typeface="Cambria Math" panose="02040503050406030204" pitchFamily="18" charset="0"/>
-                            </a:rPr>
-                          </m:ctrlPr>
-                        </m:boxPr>
-                        <m:e>
-                          <m:f>
-                            <m:fPr>
-                              <m:ctrlPr>
-                                <a:rPr lang="en-US" sz="3200" i="1">
-                                  <a:latin typeface="Cambria Math" panose="02040503050406030204" pitchFamily="18" charset="0"/>
-                                  <a:ea typeface="Cambria Math" panose="02040503050406030204" pitchFamily="18" charset="0"/>
-                                </a:rPr>
-                              </m:ctrlPr>
-                            </m:fPr>
-                            <m:num>
-                              <m:r>
-                                <m:rPr>
-                                  <m:sty m:val="p"/>
-                                </m:rPr>
-                                <a:rPr lang="en-US" sz="3200" b="0" i="0">
-                                  <a:latin typeface="Cambria Math" panose="02040503050406030204" pitchFamily="18" charset="0"/>
-                                  <a:ea typeface="Cambria Math" panose="02040503050406030204" pitchFamily="18" charset="0"/>
-                                </a:rPr>
-                                <m:t>desired</m:t>
-                              </m:r>
-                              <m:r>
-                                <a:rPr lang="en-US" sz="3200" b="0" i="0">
-                                  <a:latin typeface="Cambria Math" panose="02040503050406030204" pitchFamily="18" charset="0"/>
-                                  <a:ea typeface="Cambria Math" panose="02040503050406030204" pitchFamily="18" charset="0"/>
-                                </a:rPr>
-                                <m:t> </m:t>
-                              </m:r>
-                              <m:r>
-                                <m:rPr>
-                                  <m:sty m:val="p"/>
-                                </m:rPr>
-                                <a:rPr lang="en-US" sz="3200" b="0" i="0">
-                                  <a:latin typeface="Cambria Math" panose="02040503050406030204" pitchFamily="18" charset="0"/>
-                                  <a:ea typeface="Cambria Math" panose="02040503050406030204" pitchFamily="18" charset="0"/>
-                                </a:rPr>
-                                <m:t>print</m:t>
-                              </m:r>
-                              <m:r>
-                                <a:rPr lang="en-US" sz="3200" b="0" i="0">
-                                  <a:latin typeface="Cambria Math" panose="02040503050406030204" pitchFamily="18" charset="0"/>
-                                  <a:ea typeface="Cambria Math" panose="02040503050406030204" pitchFamily="18" charset="0"/>
-                                </a:rPr>
-                                <m:t> </m:t>
-                              </m:r>
-                              <m:r>
-                                <m:rPr>
-                                  <m:sty m:val="p"/>
-                                </m:rPr>
-                                <a:rPr lang="en-US" sz="3200" b="0" i="0">
-                                  <a:latin typeface="Cambria Math" panose="02040503050406030204" pitchFamily="18" charset="0"/>
-                                  <a:ea typeface="Cambria Math" panose="02040503050406030204" pitchFamily="18" charset="0"/>
-                                </a:rPr>
-                                <m:t>height</m:t>
-                              </m:r>
-                            </m:num>
-                            <m:den>
-                              <m:r>
-                                <m:rPr>
-                                  <m:sty m:val="p"/>
-                                </m:rPr>
-                                <a:rPr lang="en-US" sz="3200" b="0" i="0">
-                                  <a:latin typeface="Cambria Math" panose="02040503050406030204" pitchFamily="18" charset="0"/>
-                                  <a:ea typeface="Cambria Math" panose="02040503050406030204" pitchFamily="18" charset="0"/>
-                                </a:rPr>
-                                <m:t>desired</m:t>
-                              </m:r>
-                              <m:r>
-                                <a:rPr lang="en-US" sz="3200" b="0" i="0">
-                                  <a:latin typeface="Cambria Math" panose="02040503050406030204" pitchFamily="18" charset="0"/>
-                                  <a:ea typeface="Cambria Math" panose="02040503050406030204" pitchFamily="18" charset="0"/>
-                                </a:rPr>
-                                <m:t> </m:t>
-                              </m:r>
-                              <m:r>
-                                <m:rPr>
-                                  <m:sty m:val="p"/>
-                                </m:rPr>
-                                <a:rPr lang="en-US" sz="3200" b="0" i="0">
-                                  <a:latin typeface="Cambria Math" panose="02040503050406030204" pitchFamily="18" charset="0"/>
-                                  <a:ea typeface="Cambria Math" panose="02040503050406030204" pitchFamily="18" charset="0"/>
-                                </a:rPr>
-                                <m:t>print</m:t>
-                              </m:r>
-                              <m:r>
-                                <a:rPr lang="en-US" sz="3200" b="0" i="0">
-                                  <a:latin typeface="Cambria Math" panose="02040503050406030204" pitchFamily="18" charset="0"/>
-                                  <a:ea typeface="Cambria Math" panose="02040503050406030204" pitchFamily="18" charset="0"/>
-                                </a:rPr>
-                                <m:t> </m:t>
-                              </m:r>
-                              <m:r>
-                                <m:rPr>
-                                  <m:sty m:val="p"/>
-                                </m:rPr>
-                                <a:rPr lang="en-US" sz="3200" b="0" i="0">
-                                  <a:latin typeface="Cambria Math" panose="02040503050406030204" pitchFamily="18" charset="0"/>
-                                  <a:ea typeface="Cambria Math" panose="02040503050406030204" pitchFamily="18" charset="0"/>
-                                </a:rPr>
-                                <m:t>width</m:t>
-                              </m:r>
-                            </m:den>
-                          </m:f>
-                        </m:e>
-                      </m:box>
-                    </m:oMath>
-                  </m:oMathPara>
-                </a14:m>
-                <a:endParaRPr lang="en-US" sz="3200" dirty="0">
-                  <a:latin typeface="Avenir Book" panose="02000503020000020003" pitchFamily="2" charset="0"/>
-                  <a:ea typeface="Cambria Math" panose="02040503050406030204" pitchFamily="18" charset="0"/>
-                </a:endParaRPr>
-              </a:p>
-              <a:p>
-                <a:pPr eaLnBrk="1" hangingPunct="1"/>
-                <a:endParaRPr lang="en-US" sz="3200" dirty="0">
-                  <a:latin typeface="Avenir Book" panose="02000503020000020003" pitchFamily="2" charset="0"/>
-                  <a:ea typeface="Cambria Math" panose="02040503050406030204" pitchFamily="18" charset="0"/>
-                </a:endParaRPr>
-              </a:p>
-              <a:p>
-                <a:pPr eaLnBrk="1" hangingPunct="1"/>
-                <a:r>
-                  <a:rPr lang="en-US" sz="3200" dirty="0">
-                    <a:latin typeface="Avenir Book" panose="02000503020000020003" pitchFamily="2" charset="0"/>
-                    <a:ea typeface="Cambria Math" panose="02040503050406030204" pitchFamily="18" charset="0"/>
-                  </a:rPr>
-                  <a:t>Order your poster from Genigraphics and we will perform a free design review and advise you if we see anything that may be a concern for printing. We’ll even help tidy things up.</a:t>
-                </a:r>
-              </a:p>
-              <a:p>
-                <a:pPr eaLnBrk="1" hangingPunct="1"/>
-                <a:endParaRPr lang="en-US" sz="3200" dirty="0">
-                  <a:latin typeface="Avenir Book" panose="02000503020000020003" pitchFamily="2" charset="0"/>
-                  <a:ea typeface="Cambria Math" panose="02040503050406030204" pitchFamily="18" charset="0"/>
-                </a:endParaRPr>
-              </a:p>
-              <a:p>
-                <a:pPr eaLnBrk="1" hangingPunct="1"/>
-                <a:r>
-                  <a:rPr lang="en-US" sz="3200" dirty="0">
-                    <a:latin typeface="Avenir Book" panose="02000503020000020003" pitchFamily="2" charset="0"/>
-                    <a:ea typeface="Cambria Math" panose="02040503050406030204" pitchFamily="18" charset="0"/>
-                  </a:rPr>
-                  <a:t>We have more history with PowerPoint® than any other printing company. In fact, we helped Microsoft® design the software and we created all of the original color themes, templates, and clip art galleries. We know how to make your printed poster look just like it does on screen. Other printing companies and copy centers will blindly convert your file to another format prior to printing. This can result in text shifting, symbols changing, and altered colors. We know the secrets to avoid those issues. So choose Genigraphics for the most accurate reproduction available.</a:t>
-                </a:r>
-              </a:p>
-            </p:txBody>
-          </p:sp>
-        </mc:Choice>
-        <mc:Fallback xmlns="">
-          <p:sp>
-            <p:nvSpPr>
-              <p:cNvPr id="11" name="Text Box 190"/>
-              <p:cNvSpPr txBox="1">
-                <a:spLocks noRot="1" noChangeAspect="1" noMove="1" noResize="1" noEditPoints="1" noAdjustHandles="1" noChangeArrowheads="1" noChangeShapeType="1" noTextEdit="1"/>
-              </p:cNvSpPr>
-              <p:nvPr/>
-            </p:nvSpPr>
-            <p:spPr bwMode="auto">
-              <a:xfrm>
-                <a:off x="1645920" y="16276320"/>
-                <a:ext cx="11704320" cy="13175506"/>
-              </a:xfrm>
-              <a:prstGeom prst="rect">
-                <a:avLst/>
-              </a:prstGeom>
-              <a:blipFill>
-                <a:blip r:embed="rId2"/>
-                <a:stretch>
-                  <a:fillRect l="-650" r="-542"/>
-                </a:stretch>
-              </a:blipFill>
-              <a:ln w="12700">
-                <a:solidFill>
-                  <a:schemeClr val="accent1">
-                    <a:lumMod val="75000"/>
-                  </a:schemeClr>
-                </a:solidFill>
-              </a:ln>
-              <a:effectLst/>
-            </p:spPr>
-            <p:txBody>
-              <a:bodyPr/>
-              <a:lstStyle/>
-              <a:p>
-                <a:r>
-                  <a:rPr lang="en-US">
-                    <a:noFill/>
-                  </a:rPr>
-                  <a:t> </a:t>
-                </a:r>
-              </a:p>
-            </p:txBody>
-          </p:sp>
-        </mc:Fallback>
-      </mc:AlternateContent>
+      <p:sp>
+        <p:nvSpPr>
+          <p:cNvPr id="11" name="Text Box 190"/>
+          <p:cNvSpPr txBox="1">
+            <a:spLocks noChangeArrowheads="1"/>
+          </p:cNvSpPr>
+          <p:nvPr/>
+        </p:nvSpPr>
+        <p:spPr bwMode="auto">
+          <a:xfrm>
+            <a:off x="1645920" y="15643496"/>
+            <a:ext cx="11704320" cy="11941706"/>
+          </a:xfrm>
+          <a:prstGeom prst="rect">
+            <a:avLst/>
+          </a:prstGeom>
+          <a:solidFill>
+            <a:schemeClr val="bg1"/>
+          </a:solidFill>
+          <a:ln w="12700">
+            <a:solidFill>
+              <a:schemeClr val="accent1">
+                <a:lumMod val="75000"/>
+              </a:schemeClr>
+            </a:solidFill>
+          </a:ln>
+          <a:effectLst/>
+        </p:spPr>
+        <p:txBody>
+          <a:bodyPr lIns="167628" tIns="167628" rIns="167628" bIns="167628">
+            <a:spAutoFit/>
+          </a:bodyPr>
+          <a:lstStyle>
+            <a:lvl1pPr eaLnBrk="0" hangingPunct="0">
+              <a:defRPr sz="2200">
+                <a:solidFill>
+                  <a:schemeClr val="tx1"/>
+                </a:solidFill>
+                <a:latin typeface="Arial" charset="0"/>
+              </a:defRPr>
+            </a:lvl1pPr>
+            <a:lvl2pPr marL="742950" indent="-285750" eaLnBrk="0" hangingPunct="0">
+              <a:defRPr sz="2200">
+                <a:solidFill>
+                  <a:schemeClr val="tx1"/>
+                </a:solidFill>
+                <a:latin typeface="Arial" charset="0"/>
+              </a:defRPr>
+            </a:lvl2pPr>
+            <a:lvl3pPr marL="1143000" indent="-228600" eaLnBrk="0" hangingPunct="0">
+              <a:defRPr sz="2200">
+                <a:solidFill>
+                  <a:schemeClr val="tx1"/>
+                </a:solidFill>
+                <a:latin typeface="Arial" charset="0"/>
+              </a:defRPr>
+            </a:lvl3pPr>
+            <a:lvl4pPr marL="1600200" indent="-228600" eaLnBrk="0" hangingPunct="0">
+              <a:defRPr sz="2200">
+                <a:solidFill>
+                  <a:schemeClr val="tx1"/>
+                </a:solidFill>
+                <a:latin typeface="Arial" charset="0"/>
+              </a:defRPr>
+            </a:lvl4pPr>
+            <a:lvl5pPr marL="2057400" indent="-228600" eaLnBrk="0" hangingPunct="0">
+              <a:defRPr sz="2200">
+                <a:solidFill>
+                  <a:schemeClr val="tx1"/>
+                </a:solidFill>
+                <a:latin typeface="Arial" charset="0"/>
+              </a:defRPr>
+            </a:lvl5pPr>
+            <a:lvl6pPr marL="2514600" indent="-228600" eaLnBrk="0" fontAlgn="base" hangingPunct="0">
+              <a:spcBef>
+                <a:spcPct val="0"/>
+              </a:spcBef>
+              <a:spcAft>
+                <a:spcPct val="0"/>
+              </a:spcAft>
+              <a:defRPr sz="2200">
+                <a:solidFill>
+                  <a:schemeClr val="tx1"/>
+                </a:solidFill>
+                <a:latin typeface="Arial" charset="0"/>
+              </a:defRPr>
+            </a:lvl6pPr>
+            <a:lvl7pPr marL="2971800" indent="-228600" eaLnBrk="0" fontAlgn="base" hangingPunct="0">
+              <a:spcBef>
+                <a:spcPct val="0"/>
+              </a:spcBef>
+              <a:spcAft>
+                <a:spcPct val="0"/>
+              </a:spcAft>
+              <a:defRPr sz="2200">
+                <a:solidFill>
+                  <a:schemeClr val="tx1"/>
+                </a:solidFill>
+                <a:latin typeface="Arial" charset="0"/>
+              </a:defRPr>
+            </a:lvl7pPr>
+            <a:lvl8pPr marL="3429000" indent="-228600" eaLnBrk="0" fontAlgn="base" hangingPunct="0">
+              <a:spcBef>
+                <a:spcPct val="0"/>
+              </a:spcBef>
+              <a:spcAft>
+                <a:spcPct val="0"/>
+              </a:spcAft>
+              <a:defRPr sz="2200">
+                <a:solidFill>
+                  <a:schemeClr val="tx1"/>
+                </a:solidFill>
+                <a:latin typeface="Arial" charset="0"/>
+              </a:defRPr>
+            </a:lvl8pPr>
+            <a:lvl9pPr marL="3886200" indent="-228600" eaLnBrk="0" fontAlgn="base" hangingPunct="0">
+              <a:spcBef>
+                <a:spcPct val="0"/>
+              </a:spcBef>
+              <a:spcAft>
+                <a:spcPct val="0"/>
+              </a:spcAft>
+              <a:defRPr sz="2200">
+                <a:solidFill>
+                  <a:schemeClr val="tx1"/>
+                </a:solidFill>
+                <a:latin typeface="Arial" charset="0"/>
+              </a:defRPr>
+            </a:lvl9pPr>
+          </a:lstStyle>
+          <a:p>
+            <a:pPr eaLnBrk="1" hangingPunct="1"/>
+            <a:r>
+              <a:rPr lang="en-US" sz="2600" dirty="0">
+                <a:latin typeface="Avenir Book" panose="02000503020000020003" pitchFamily="2" charset="0"/>
+              </a:rPr>
+              <a:t>Synthetic biology focuses on the engineering of devices, pathways, networks, and systems that utilize tools which already exist in biology. There is a growing interest in the development and application of genetically-programmed synthetic cells for future use. These cell-free systems can be used as environments in which more complex engineered systems can be implemented and designed [9]. </a:t>
+            </a:r>
+          </a:p>
+          <a:p>
+            <a:pPr eaLnBrk="1" hangingPunct="1"/>
+            <a:r>
+              <a:rPr lang="en-US" sz="2600" dirty="0">
+                <a:latin typeface="Avenir Book" panose="02000503020000020003" pitchFamily="2" charset="0"/>
+              </a:rPr>
+              <a:t>When building synthetic cells, there are five main subsystems to be considered. These are: spatial organization, metabolic subsystems, sensing and signaling, regulation and computation, and actuation. The problem we have chosen to tackle involves the metabolic subsystems, specifically the power supply and energy lifetime [11]. We aim to extend the lifetimes of synthetic cells derived from liposomes by implementing an ATP life extension mechanism. This mechanism can be a biochemical ATP regeneration pathway, a directed transporter, etc. An efficient, longer-lasting method to provide energy required for internal reactions will allow us to carry out more complex, sustainable experiments. We will be able to broaden the range of possible research in synthetic cells if we can measure responses, production, etc. for longer time periods.</a:t>
+            </a:r>
+          </a:p>
+          <a:p>
+            <a:pPr eaLnBrk="1" hangingPunct="1"/>
+            <a:r>
+              <a:rPr lang="en-US" sz="2600" dirty="0">
+                <a:latin typeface="Avenir Book" panose="02000503020000020003" pitchFamily="2" charset="0"/>
+              </a:rPr>
+              <a:t>The two mechanisms we studied are an ATP rheostat mechanism and an ATP synthase mechanism. The ATP rheostat was published by James Bowie Lab at UCLA. It can maintain ATP concentrations for up to 70 hours in buffer. See Figure 1 below for the reaction pathway. We want to explore whether the rheostat can extend ATP levels in synthetic cells with TX/TL, a transcription/translation system that creates protein from linear DNA templates [1,6,7]. Secondly, we investigated an ATP synthase model. This is a membrane protein that synthesizes ATP from ADP and Pi when there is a proton gradient (protons flow into the liposome). We also include a proton pump that pumps out H+ ions so that we can maintain the proton gradient necessary for ATP synthesis. A schematic shown below in Figure 2. </a:t>
+            </a:r>
+          </a:p>
+        </p:txBody>
+      </p:sp>
       <p:sp>
         <p:nvSpPr>
           <p:cNvPr id="45" name="Rectangle 44"/>
@@ -8775,7 +8335,7 @@
         </p:nvSpPr>
         <p:spPr>
           <a:xfrm>
-            <a:off x="14264640" y="15453360"/>
+            <a:off x="14264640" y="14825871"/>
             <a:ext cx="11704320" cy="822960"/>
           </a:xfrm>
           <a:prstGeom prst="rect">
@@ -8825,111 +8385,6 @@
           </a:p>
         </p:txBody>
       </p:sp>
-      <p:pic>
-        <p:nvPicPr>
-          <p:cNvPr id="49" name="Picture 178" descr="Picture1"/>
-          <p:cNvPicPr>
-            <a:picLocks noChangeAspect="1" noChangeArrowheads="1"/>
-          </p:cNvPicPr>
-          <p:nvPr/>
-        </p:nvPicPr>
-        <p:blipFill>
-          <a:blip r:embed="rId3">
-            <a:extLst>
-              <a:ext uri="{28A0092B-C50C-407E-A947-70E740481C1C}">
-                <a14:useLocalDpi xmlns:a14="http://schemas.microsoft.com/office/drawing/2010/main" val="0"/>
-              </a:ext>
-            </a:extLst>
-          </a:blip>
-          <a:srcRect/>
-          <a:stretch>
-            <a:fillRect/>
-          </a:stretch>
-        </p:blipFill>
-        <p:spPr bwMode="auto">
-          <a:xfrm>
-            <a:off x="2025649" y="30314901"/>
-            <a:ext cx="5029200" cy="3352605"/>
-          </a:xfrm>
-          <a:prstGeom prst="rect">
-            <a:avLst/>
-          </a:prstGeom>
-          <a:noFill/>
-          <a:ln w="9525">
-            <a:solidFill>
-              <a:schemeClr val="tx2">
-                <a:lumMod val="50000"/>
-              </a:schemeClr>
-            </a:solidFill>
-            <a:miter lim="800000"/>
-            <a:headEnd/>
-            <a:tailEnd/>
-          </a:ln>
-          <a:extLst>
-            <a:ext uri="{909E8E84-426E-40DD-AFC4-6F175D3DCCD1}">
-              <a14:hiddenFill xmlns:a14="http://schemas.microsoft.com/office/drawing/2010/main">
-                <a:solidFill>
-                  <a:srgbClr val="FFFFFF"/>
-                </a:solidFill>
-              </a14:hiddenFill>
-            </a:ext>
-          </a:extLst>
-        </p:spPr>
-      </p:pic>
-      <p:pic>
-        <p:nvPicPr>
-          <p:cNvPr id="50" name="Picture 179" descr="Picture2"/>
-          <p:cNvPicPr>
-            <a:picLocks noChangeAspect="1" noChangeArrowheads="1"/>
-          </p:cNvPicPr>
-          <p:nvPr/>
-        </p:nvPicPr>
-        <p:blipFill>
-          <a:blip r:embed="rId4">
-            <a:extLst>
-              <a:ext uri="{28A0092B-C50C-407E-A947-70E740481C1C}">
-                <a14:useLocalDpi xmlns:a14="http://schemas.microsoft.com/office/drawing/2010/main" val="0"/>
-              </a:ext>
-            </a:extLst>
-          </a:blip>
-          <a:srcRect/>
-          <a:stretch>
-            <a:fillRect/>
-          </a:stretch>
-        </p:blipFill>
-        <p:spPr bwMode="auto">
-          <a:xfrm>
-            <a:off x="8172450" y="30314900"/>
-            <a:ext cx="5029200" cy="3352606"/>
-          </a:xfrm>
-          <a:prstGeom prst="rect">
-            <a:avLst/>
-          </a:prstGeom>
-          <a:noFill/>
-          <a:ln>
-            <a:noFill/>
-          </a:ln>
-          <a:extLst>
-            <a:ext uri="{909E8E84-426E-40DD-AFC4-6F175D3DCCD1}">
-              <a14:hiddenFill xmlns:a14="http://schemas.microsoft.com/office/drawing/2010/main">
-                <a:solidFill>
-                  <a:srgbClr val="FFFFFF"/>
-                </a:solidFill>
-              </a14:hiddenFill>
-            </a:ext>
-            <a:ext uri="{91240B29-F687-4F45-9708-019B960494DF}">
-              <a14:hiddenLine xmlns:a14="http://schemas.microsoft.com/office/drawing/2010/main" w="9525">
-                <a:solidFill>
-                  <a:srgbClr val="000000"/>
-                </a:solidFill>
-                <a:miter lim="800000"/>
-                <a:headEnd/>
-                <a:tailEnd/>
-              </a14:hiddenLine>
-            </a:ext>
-          </a:extLst>
-        </p:spPr>
-      </p:pic>
       <p:sp>
         <p:nvSpPr>
           <p:cNvPr id="51" name="Text Box 180"/>
@@ -8940,8 +8395,8 @@
         </p:nvSpPr>
         <p:spPr bwMode="auto">
           <a:xfrm>
-            <a:off x="2025652" y="33877251"/>
-            <a:ext cx="5019888" cy="515520"/>
+            <a:off x="1449561" y="33767272"/>
+            <a:ext cx="5670548" cy="1377294"/>
           </a:xfrm>
           <a:prstGeom prst="rect">
             <a:avLst/>
@@ -8981,7 +8436,7 @@
           </a:extLst>
         </p:spPr>
         <p:txBody>
-          <a:bodyPr wrap="none" lIns="83814" tIns="41907" rIns="83814" bIns="41907">
+          <a:bodyPr wrap="square" lIns="83814" tIns="41907" rIns="83814" bIns="41907">
             <a:spAutoFit/>
           </a:bodyPr>
           <a:lstStyle>
@@ -9089,7 +8544,7 @@
                 <a:latin typeface="Avenir Book" panose="02000503020000020003" pitchFamily="2" charset="0"/>
                 <a:ea typeface="Cambria Math" panose="02040503050406030204" pitchFamily="18" charset="0"/>
               </a:rPr>
-              <a:t>Figure 1. Label in 28pt Calibri.</a:t>
+              <a:t>Figure 1. Entire Rheostat pathway as shown in the Opgenorth et al paper [7].</a:t>
             </a:r>
           </a:p>
         </p:txBody>
@@ -9104,8 +8559,8 @@
         </p:nvSpPr>
         <p:spPr bwMode="auto">
           <a:xfrm>
-            <a:off x="8172452" y="33877251"/>
-            <a:ext cx="5019888" cy="515520"/>
+            <a:off x="7403846" y="33336385"/>
+            <a:ext cx="5540356" cy="1808181"/>
           </a:xfrm>
           <a:prstGeom prst="rect">
             <a:avLst/>
@@ -9145,7 +8600,7 @@
           </a:extLst>
         </p:spPr>
         <p:txBody>
-          <a:bodyPr wrap="none" lIns="83814" tIns="41907" rIns="83814" bIns="41907">
+          <a:bodyPr wrap="square" lIns="83814" tIns="41907" rIns="83814" bIns="41907">
             <a:spAutoFit/>
           </a:bodyPr>
           <a:lstStyle>
@@ -9253,171 +8708,7 @@
                 <a:latin typeface="Avenir Book" panose="02000503020000020003" pitchFamily="2" charset="0"/>
                 <a:ea typeface="Cambria Math" panose="02040503050406030204" pitchFamily="18" charset="0"/>
               </a:rPr>
-              <a:t>Figure 2. Label in 28pt Calibri.</a:t>
-            </a:r>
-          </a:p>
-        </p:txBody>
-      </p:sp>
-      <p:sp>
-        <p:nvSpPr>
-          <p:cNvPr id="53" name="Text Box 180"/>
-          <p:cNvSpPr txBox="1">
-            <a:spLocks noChangeArrowheads="1"/>
-          </p:cNvSpPr>
-          <p:nvPr/>
-        </p:nvSpPr>
-        <p:spPr bwMode="auto">
-          <a:xfrm>
-            <a:off x="14022523" y="26971432"/>
-            <a:ext cx="4859844" cy="515520"/>
-          </a:xfrm>
-          <a:prstGeom prst="rect">
-            <a:avLst/>
-          </a:prstGeom>
-          <a:noFill/>
-          <a:ln>
-            <a:noFill/>
-          </a:ln>
-          <a:effectLst/>
-          <a:extLst>
-            <a:ext uri="{909E8E84-426E-40DD-AFC4-6F175D3DCCD1}">
-              <a14:hiddenFill xmlns:a14="http://schemas.microsoft.com/office/drawing/2010/main">
-                <a:solidFill>
-                  <a:schemeClr val="accent1"/>
-                </a:solidFill>
-              </a14:hiddenFill>
-            </a:ext>
-            <a:ext uri="{91240B29-F687-4F45-9708-019B960494DF}">
-              <a14:hiddenLine xmlns:a14="http://schemas.microsoft.com/office/drawing/2010/main" w="9525">
-                <a:solidFill>
-                  <a:schemeClr val="tx1"/>
-                </a:solidFill>
-                <a:miter lim="800000"/>
-                <a:headEnd/>
-                <a:tailEnd/>
-              </a14:hiddenLine>
-            </a:ext>
-            <a:ext uri="{AF507438-7753-43E0-B8FC-AC1667EBCBE1}">
-              <a14:hiddenEffects xmlns:a14="http://schemas.microsoft.com/office/drawing/2010/main">
-                <a:effectLst>
-                  <a:outerShdw dist="35921" dir="2700000" algn="ctr" rotWithShape="0">
-                    <a:schemeClr val="bg2"/>
-                  </a:outerShdw>
-                </a:effectLst>
-              </a14:hiddenEffects>
-            </a:ext>
-          </a:extLst>
-        </p:spPr>
-        <p:txBody>
-          <a:bodyPr wrap="none" lIns="83814" tIns="41907" rIns="83814" bIns="41907">
-            <a:spAutoFit/>
-          </a:bodyPr>
-          <a:lstStyle>
-            <a:lvl1pPr defTabSz="4389438" eaLnBrk="0" hangingPunct="0">
-              <a:defRPr sz="2200">
-                <a:solidFill>
-                  <a:schemeClr val="tx1"/>
-                </a:solidFill>
-                <a:latin typeface="Arial" charset="0"/>
-              </a:defRPr>
-            </a:lvl1pPr>
-            <a:lvl2pPr marL="742950" indent="-285750" defTabSz="4389438" eaLnBrk="0" hangingPunct="0">
-              <a:defRPr sz="2200">
-                <a:solidFill>
-                  <a:schemeClr val="tx1"/>
-                </a:solidFill>
-                <a:latin typeface="Arial" charset="0"/>
-              </a:defRPr>
-            </a:lvl2pPr>
-            <a:lvl3pPr marL="1143000" indent="-228600" defTabSz="4389438" eaLnBrk="0" hangingPunct="0">
-              <a:defRPr sz="2200">
-                <a:solidFill>
-                  <a:schemeClr val="tx1"/>
-                </a:solidFill>
-                <a:latin typeface="Arial" charset="0"/>
-              </a:defRPr>
-            </a:lvl3pPr>
-            <a:lvl4pPr marL="1600200" indent="-228600" defTabSz="4389438" eaLnBrk="0" hangingPunct="0">
-              <a:defRPr sz="2200">
-                <a:solidFill>
-                  <a:schemeClr val="tx1"/>
-                </a:solidFill>
-                <a:latin typeface="Arial" charset="0"/>
-              </a:defRPr>
-            </a:lvl4pPr>
-            <a:lvl5pPr marL="2057400" indent="-228600" defTabSz="4389438" eaLnBrk="0" hangingPunct="0">
-              <a:defRPr sz="2200">
-                <a:solidFill>
-                  <a:schemeClr val="tx1"/>
-                </a:solidFill>
-                <a:latin typeface="Arial" charset="0"/>
-              </a:defRPr>
-            </a:lvl5pPr>
-            <a:lvl6pPr marL="2514600" indent="-228600" defTabSz="4389438" eaLnBrk="0" fontAlgn="base" hangingPunct="0">
-              <a:spcBef>
-                <a:spcPct val="0"/>
-              </a:spcBef>
-              <a:spcAft>
-                <a:spcPct val="0"/>
-              </a:spcAft>
-              <a:defRPr sz="2200">
-                <a:solidFill>
-                  <a:schemeClr val="tx1"/>
-                </a:solidFill>
-                <a:latin typeface="Arial" charset="0"/>
-              </a:defRPr>
-            </a:lvl6pPr>
-            <a:lvl7pPr marL="2971800" indent="-228600" defTabSz="4389438" eaLnBrk="0" fontAlgn="base" hangingPunct="0">
-              <a:spcBef>
-                <a:spcPct val="0"/>
-              </a:spcBef>
-              <a:spcAft>
-                <a:spcPct val="0"/>
-              </a:spcAft>
-              <a:defRPr sz="2200">
-                <a:solidFill>
-                  <a:schemeClr val="tx1"/>
-                </a:solidFill>
-                <a:latin typeface="Arial" charset="0"/>
-              </a:defRPr>
-            </a:lvl7pPr>
-            <a:lvl8pPr marL="3429000" indent="-228600" defTabSz="4389438" eaLnBrk="0" fontAlgn="base" hangingPunct="0">
-              <a:spcBef>
-                <a:spcPct val="0"/>
-              </a:spcBef>
-              <a:spcAft>
-                <a:spcPct val="0"/>
-              </a:spcAft>
-              <a:defRPr sz="2200">
-                <a:solidFill>
-                  <a:schemeClr val="tx1"/>
-                </a:solidFill>
-                <a:latin typeface="Arial" charset="0"/>
-              </a:defRPr>
-            </a:lvl8pPr>
-            <a:lvl9pPr marL="3886200" indent="-228600" defTabSz="4389438" eaLnBrk="0" fontAlgn="base" hangingPunct="0">
-              <a:spcBef>
-                <a:spcPct val="0"/>
-              </a:spcBef>
-              <a:spcAft>
-                <a:spcPct val="0"/>
-              </a:spcAft>
-              <a:defRPr sz="2200">
-                <a:solidFill>
-                  <a:schemeClr val="tx1"/>
-                </a:solidFill>
-                <a:latin typeface="Arial" charset="0"/>
-              </a:defRPr>
-            </a:lvl9pPr>
-          </a:lstStyle>
-          <a:p>
-            <a:pPr algn="ctr" eaLnBrk="1" hangingPunct="1"/>
-            <a:r>
-              <a:rPr lang="en-US" sz="2800" dirty="0">
-                <a:latin typeface="Avenir Book" panose="02000503020000020003" pitchFamily="2" charset="0"/>
-                <a:ea typeface="Cambria Math" panose="02040503050406030204" pitchFamily="18" charset="0"/>
-              </a:rPr>
-              <a:t>Table 1. Label in 28pt Calibri.</a:t>
+              <a:t>Figure 2. ATP Synthase (purple) Model schematic. We include a proton pump (green) to maintain the proton gradient</a:t>
             </a:r>
           </a:p>
         </p:txBody>
@@ -9603,7 +8894,7 @@
             <a:avLst/>
           </a:prstGeom>
           <a:blipFill dpi="0" rotWithShape="1">
-            <a:blip r:embed="rId5">
+            <a:blip r:embed="rId3">
               <a:lum bright="70000" contrast="-70000"/>
             </a:blip>
             <a:srcRect/>
@@ -9674,7 +8965,7 @@
             <a:avLst/>
           </a:prstGeom>
           <a:blipFill dpi="0" rotWithShape="1">
-            <a:blip r:embed="rId5">
+            <a:blip r:embed="rId3">
               <a:lum bright="70000" contrast="-70000"/>
             </a:blip>
             <a:srcRect/>
@@ -9752,10 +9043,1508 @@
         </p:xfrm>
         <a:graphic>
           <a:graphicData uri="http://schemas.openxmlformats.org/drawingml/2006/chart">
-            <c:chart xmlns:c="http://schemas.openxmlformats.org/drawingml/2006/chart" xmlns:r="http://schemas.openxmlformats.org/officeDocument/2006/relationships" r:id="rId6"/>
+            <c:chart xmlns:c="http://schemas.openxmlformats.org/drawingml/2006/chart" xmlns:r="http://schemas.openxmlformats.org/officeDocument/2006/relationships" r:id="rId4"/>
           </a:graphicData>
         </a:graphic>
       </p:graphicFrame>
+      <p:pic>
+        <p:nvPicPr>
+          <p:cNvPr id="38" name="Content Placeholder 4" descr="A close up of a map&#10;&#10;Description automatically generated">
+            <a:extLst>
+              <a:ext uri="{FF2B5EF4-FFF2-40B4-BE49-F238E27FC236}">
+                <a16:creationId xmlns:a16="http://schemas.microsoft.com/office/drawing/2014/main" id="{207D8F08-7127-C24B-8CAC-5AB012895F2C}"/>
+              </a:ext>
+            </a:extLst>
+          </p:cNvPr>
+          <p:cNvPicPr>
+            <a:picLocks noChangeAspect="1"/>
+          </p:cNvPicPr>
+          <p:nvPr/>
+        </p:nvPicPr>
+        <p:blipFill>
+          <a:blip r:embed="rId5"/>
+          <a:stretch>
+            <a:fillRect/>
+          </a:stretch>
+        </p:blipFill>
+        <p:spPr>
+          <a:xfrm>
+            <a:off x="2747199" y="27912526"/>
+            <a:ext cx="2453349" cy="5645954"/>
+          </a:xfrm>
+          <a:prstGeom prst="rect">
+            <a:avLst/>
+          </a:prstGeom>
+        </p:spPr>
+      </p:pic>
+      <p:pic>
+        <p:nvPicPr>
+          <p:cNvPr id="39" name="Picture 38" descr="A close up of text on a white background&#10;&#10;Description automatically generated">
+            <a:extLst>
+              <a:ext uri="{FF2B5EF4-FFF2-40B4-BE49-F238E27FC236}">
+                <a16:creationId xmlns:a16="http://schemas.microsoft.com/office/drawing/2014/main" id="{980FFAC9-771D-E24C-808E-A79BB5422D77}"/>
+              </a:ext>
+            </a:extLst>
+          </p:cNvPr>
+          <p:cNvPicPr>
+            <a:picLocks noChangeAspect="1"/>
+          </p:cNvPicPr>
+          <p:nvPr/>
+        </p:nvPicPr>
+        <p:blipFill rotWithShape="1">
+          <a:blip r:embed="rId6"/>
+          <a:srcRect t="2418" b="3839"/>
+          <a:stretch/>
+        </p:blipFill>
+        <p:spPr>
+          <a:xfrm>
+            <a:off x="7304480" y="27829834"/>
+            <a:ext cx="5540356" cy="5305783"/>
+          </a:xfrm>
+          <a:prstGeom prst="rect">
+            <a:avLst/>
+          </a:prstGeom>
+        </p:spPr>
+      </p:pic>
+      <p:grpSp>
+        <p:nvGrpSpPr>
+          <p:cNvPr id="23" name="Group 22">
+            <a:extLst>
+              <a:ext uri="{FF2B5EF4-FFF2-40B4-BE49-F238E27FC236}">
+                <a16:creationId xmlns:a16="http://schemas.microsoft.com/office/drawing/2014/main" id="{96EFE115-F37B-3F40-B699-3BEB1A3C0CC2}"/>
+              </a:ext>
+            </a:extLst>
+          </p:cNvPr>
+          <p:cNvGrpSpPr/>
+          <p:nvPr/>
+        </p:nvGrpSpPr>
+        <p:grpSpPr>
+          <a:xfrm>
+            <a:off x="14693316" y="25547526"/>
+            <a:ext cx="10041319" cy="4130608"/>
+            <a:chOff x="14264640" y="29831543"/>
+            <a:chExt cx="10041319" cy="4130608"/>
+          </a:xfrm>
+        </p:grpSpPr>
+        <p:pic>
+          <p:nvPicPr>
+            <p:cNvPr id="20" name="Picture 19" descr="A close up of a map&#10;&#10;Description automatically generated">
+              <a:extLst>
+                <a:ext uri="{FF2B5EF4-FFF2-40B4-BE49-F238E27FC236}">
+                  <a16:creationId xmlns:a16="http://schemas.microsoft.com/office/drawing/2014/main" id="{DE33E90A-BA1E-7C4C-B80A-2515440CC9F2}"/>
+                </a:ext>
+              </a:extLst>
+            </p:cNvPr>
+            <p:cNvPicPr>
+              <a:picLocks noChangeAspect="1"/>
+            </p:cNvPicPr>
+            <p:nvPr/>
+          </p:nvPicPr>
+          <p:blipFill>
+            <a:blip r:embed="rId7">
+              <a:extLst>
+                <a:ext uri="{28A0092B-C50C-407E-A947-70E740481C1C}">
+                  <a14:useLocalDpi xmlns:a14="http://schemas.microsoft.com/office/drawing/2010/main" val="0"/>
+                </a:ext>
+              </a:extLst>
+            </a:blip>
+            <a:stretch>
+              <a:fillRect/>
+            </a:stretch>
+          </p:blipFill>
+          <p:spPr>
+            <a:xfrm>
+              <a:off x="14264640" y="30070182"/>
+              <a:ext cx="4937760" cy="2743200"/>
+            </a:xfrm>
+            <a:prstGeom prst="rect">
+              <a:avLst/>
+            </a:prstGeom>
+          </p:spPr>
+        </p:pic>
+        <p:pic>
+          <p:nvPicPr>
+            <p:cNvPr id="22" name="Picture 21" descr="A close up of a piece of paper&#10;&#10;Description automatically generated">
+              <a:extLst>
+                <a:ext uri="{FF2B5EF4-FFF2-40B4-BE49-F238E27FC236}">
+                  <a16:creationId xmlns:a16="http://schemas.microsoft.com/office/drawing/2014/main" id="{7B822957-A7B6-1A4E-9C98-7D78F0EFBD16}"/>
+                </a:ext>
+              </a:extLst>
+            </p:cNvPr>
+            <p:cNvPicPr>
+              <a:picLocks noChangeAspect="1"/>
+            </p:cNvPicPr>
+            <p:nvPr/>
+          </p:nvPicPr>
+          <p:blipFill>
+            <a:blip r:embed="rId8">
+              <a:extLst>
+                <a:ext uri="{28A0092B-C50C-407E-A947-70E740481C1C}">
+                  <a14:useLocalDpi xmlns:a14="http://schemas.microsoft.com/office/drawing/2010/main" val="0"/>
+                </a:ext>
+              </a:extLst>
+            </a:blip>
+            <a:stretch>
+              <a:fillRect/>
+            </a:stretch>
+          </p:blipFill>
+          <p:spPr>
+            <a:xfrm>
+              <a:off x="19368199" y="30070182"/>
+              <a:ext cx="4937760" cy="2743200"/>
+            </a:xfrm>
+            <a:prstGeom prst="rect">
+              <a:avLst/>
+            </a:prstGeom>
+          </p:spPr>
+        </p:pic>
+        <p:sp>
+          <p:nvSpPr>
+            <p:cNvPr id="46" name="Text Box 181">
+              <a:extLst>
+                <a:ext uri="{FF2B5EF4-FFF2-40B4-BE49-F238E27FC236}">
+                  <a16:creationId xmlns:a16="http://schemas.microsoft.com/office/drawing/2014/main" id="{217C5ED6-DEA8-A64F-8AF4-CC8998CBF32A}"/>
+                </a:ext>
+              </a:extLst>
+            </p:cNvPr>
+            <p:cNvSpPr txBox="1">
+              <a:spLocks noChangeArrowheads="1"/>
+            </p:cNvSpPr>
+            <p:nvPr/>
+          </p:nvSpPr>
+          <p:spPr bwMode="auto">
+            <a:xfrm>
+              <a:off x="14572329" y="32769523"/>
+              <a:ext cx="9733629" cy="1192628"/>
+            </a:xfrm>
+            <a:prstGeom prst="rect">
+              <a:avLst/>
+            </a:prstGeom>
+            <a:noFill/>
+            <a:ln>
+              <a:noFill/>
+            </a:ln>
+            <a:effectLst/>
+            <a:extLst>
+              <a:ext uri="{909E8E84-426E-40DD-AFC4-6F175D3DCCD1}">
+                <a14:hiddenFill xmlns:a14="http://schemas.microsoft.com/office/drawing/2010/main">
+                  <a:solidFill>
+                    <a:schemeClr val="accent1"/>
+                  </a:solidFill>
+                </a14:hiddenFill>
+              </a:ext>
+              <a:ext uri="{91240B29-F687-4F45-9708-019B960494DF}">
+                <a14:hiddenLine xmlns:a14="http://schemas.microsoft.com/office/drawing/2010/main" w="9525">
+                  <a:solidFill>
+                    <a:schemeClr val="tx1"/>
+                  </a:solidFill>
+                  <a:miter lim="800000"/>
+                  <a:headEnd/>
+                  <a:tailEnd/>
+                </a14:hiddenLine>
+              </a:ext>
+              <a:ext uri="{AF507438-7753-43E0-B8FC-AC1667EBCBE1}">
+                <a14:hiddenEffects xmlns:a14="http://schemas.microsoft.com/office/drawing/2010/main">
+                  <a:effectLst>
+                    <a:outerShdw dist="35921" dir="2700000" algn="ctr" rotWithShape="0">
+                      <a:schemeClr val="bg2"/>
+                    </a:outerShdw>
+                  </a:effectLst>
+                </a14:hiddenEffects>
+              </a:ext>
+            </a:extLst>
+          </p:spPr>
+          <p:txBody>
+            <a:bodyPr wrap="square" lIns="83814" tIns="41907" rIns="83814" bIns="41907">
+              <a:spAutoFit/>
+            </a:bodyPr>
+            <a:lstStyle>
+              <a:lvl1pPr defTabSz="4389438" eaLnBrk="0" hangingPunct="0">
+                <a:defRPr sz="2200">
+                  <a:solidFill>
+                    <a:schemeClr val="tx1"/>
+                  </a:solidFill>
+                  <a:latin typeface="Arial" charset="0"/>
+                </a:defRPr>
+              </a:lvl1pPr>
+              <a:lvl2pPr marL="742950" indent="-285750" defTabSz="4389438" eaLnBrk="0" hangingPunct="0">
+                <a:defRPr sz="2200">
+                  <a:solidFill>
+                    <a:schemeClr val="tx1"/>
+                  </a:solidFill>
+                  <a:latin typeface="Arial" charset="0"/>
+                </a:defRPr>
+              </a:lvl2pPr>
+              <a:lvl3pPr marL="1143000" indent="-228600" defTabSz="4389438" eaLnBrk="0" hangingPunct="0">
+                <a:defRPr sz="2200">
+                  <a:solidFill>
+                    <a:schemeClr val="tx1"/>
+                  </a:solidFill>
+                  <a:latin typeface="Arial" charset="0"/>
+                </a:defRPr>
+              </a:lvl3pPr>
+              <a:lvl4pPr marL="1600200" indent="-228600" defTabSz="4389438" eaLnBrk="0" hangingPunct="0">
+                <a:defRPr sz="2200">
+                  <a:solidFill>
+                    <a:schemeClr val="tx1"/>
+                  </a:solidFill>
+                  <a:latin typeface="Arial" charset="0"/>
+                </a:defRPr>
+              </a:lvl4pPr>
+              <a:lvl5pPr marL="2057400" indent="-228600" defTabSz="4389438" eaLnBrk="0" hangingPunct="0">
+                <a:defRPr sz="2200">
+                  <a:solidFill>
+                    <a:schemeClr val="tx1"/>
+                  </a:solidFill>
+                  <a:latin typeface="Arial" charset="0"/>
+                </a:defRPr>
+              </a:lvl5pPr>
+              <a:lvl6pPr marL="2514600" indent="-228600" defTabSz="4389438" eaLnBrk="0" fontAlgn="base" hangingPunct="0">
+                <a:spcBef>
+                  <a:spcPct val="0"/>
+                </a:spcBef>
+                <a:spcAft>
+                  <a:spcPct val="0"/>
+                </a:spcAft>
+                <a:defRPr sz="2200">
+                  <a:solidFill>
+                    <a:schemeClr val="tx1"/>
+                  </a:solidFill>
+                  <a:latin typeface="Arial" charset="0"/>
+                </a:defRPr>
+              </a:lvl6pPr>
+              <a:lvl7pPr marL="2971800" indent="-228600" defTabSz="4389438" eaLnBrk="0" fontAlgn="base" hangingPunct="0">
+                <a:spcBef>
+                  <a:spcPct val="0"/>
+                </a:spcBef>
+                <a:spcAft>
+                  <a:spcPct val="0"/>
+                </a:spcAft>
+                <a:defRPr sz="2200">
+                  <a:solidFill>
+                    <a:schemeClr val="tx1"/>
+                  </a:solidFill>
+                  <a:latin typeface="Arial" charset="0"/>
+                </a:defRPr>
+              </a:lvl7pPr>
+              <a:lvl8pPr marL="3429000" indent="-228600" defTabSz="4389438" eaLnBrk="0" fontAlgn="base" hangingPunct="0">
+                <a:spcBef>
+                  <a:spcPct val="0"/>
+                </a:spcBef>
+                <a:spcAft>
+                  <a:spcPct val="0"/>
+                </a:spcAft>
+                <a:defRPr sz="2200">
+                  <a:solidFill>
+                    <a:schemeClr val="tx1"/>
+                  </a:solidFill>
+                  <a:latin typeface="Arial" charset="0"/>
+                </a:defRPr>
+              </a:lvl8pPr>
+              <a:lvl9pPr marL="3886200" indent="-228600" defTabSz="4389438" eaLnBrk="0" fontAlgn="base" hangingPunct="0">
+                <a:spcBef>
+                  <a:spcPct val="0"/>
+                </a:spcBef>
+                <a:spcAft>
+                  <a:spcPct val="0"/>
+                </a:spcAft>
+                <a:defRPr sz="2200">
+                  <a:solidFill>
+                    <a:schemeClr val="tx1"/>
+                  </a:solidFill>
+                  <a:latin typeface="Arial" charset="0"/>
+                </a:defRPr>
+              </a:lvl9pPr>
+            </a:lstStyle>
+            <a:p>
+              <a:pPr eaLnBrk="1" hangingPunct="1"/>
+              <a:r>
+                <a:rPr lang="en-US" sz="2400" dirty="0">
+                  <a:latin typeface="Avenir Book" panose="02000503020000020003" pitchFamily="2" charset="0"/>
+                  <a:ea typeface="Cambria Math" panose="02040503050406030204" pitchFamily="18" charset="0"/>
+                </a:rPr>
+                <a:t>Figure 4. Simulations of the ATP rheostat pathway. We see stoichiometric production of isobutanol (4a) and extended ATP production with the rheostat (4b). </a:t>
+              </a:r>
+            </a:p>
+          </p:txBody>
+        </p:sp>
+        <p:sp>
+          <p:nvSpPr>
+            <p:cNvPr id="47" name="Text Box 181">
+              <a:extLst>
+                <a:ext uri="{FF2B5EF4-FFF2-40B4-BE49-F238E27FC236}">
+                  <a16:creationId xmlns:a16="http://schemas.microsoft.com/office/drawing/2014/main" id="{E43F2A79-1803-E648-80E1-22E70033554F}"/>
+                </a:ext>
+              </a:extLst>
+            </p:cNvPr>
+            <p:cNvSpPr txBox="1">
+              <a:spLocks noChangeArrowheads="1"/>
+            </p:cNvSpPr>
+            <p:nvPr/>
+          </p:nvSpPr>
+          <p:spPr bwMode="auto">
+            <a:xfrm>
+              <a:off x="14283149" y="29831543"/>
+              <a:ext cx="578359" cy="327730"/>
+            </a:xfrm>
+            <a:prstGeom prst="rect">
+              <a:avLst/>
+            </a:prstGeom>
+            <a:noFill/>
+            <a:ln>
+              <a:noFill/>
+            </a:ln>
+            <a:effectLst/>
+            <a:extLst>
+              <a:ext uri="{909E8E84-426E-40DD-AFC4-6F175D3DCCD1}">
+                <a14:hiddenFill xmlns:a14="http://schemas.microsoft.com/office/drawing/2010/main">
+                  <a:solidFill>
+                    <a:schemeClr val="accent1"/>
+                  </a:solidFill>
+                </a14:hiddenFill>
+              </a:ext>
+              <a:ext uri="{91240B29-F687-4F45-9708-019B960494DF}">
+                <a14:hiddenLine xmlns:a14="http://schemas.microsoft.com/office/drawing/2010/main" w="9525">
+                  <a:solidFill>
+                    <a:schemeClr val="tx1"/>
+                  </a:solidFill>
+                  <a:miter lim="800000"/>
+                  <a:headEnd/>
+                  <a:tailEnd/>
+                </a14:hiddenLine>
+              </a:ext>
+              <a:ext uri="{AF507438-7753-43E0-B8FC-AC1667EBCBE1}">
+                <a14:hiddenEffects xmlns:a14="http://schemas.microsoft.com/office/drawing/2010/main">
+                  <a:effectLst>
+                    <a:outerShdw dist="35921" dir="2700000" algn="ctr" rotWithShape="0">
+                      <a:schemeClr val="bg2"/>
+                    </a:outerShdw>
+                  </a:effectLst>
+                </a14:hiddenEffects>
+              </a:ext>
+            </a:extLst>
+          </p:spPr>
+          <p:txBody>
+            <a:bodyPr wrap="square" lIns="83814" tIns="41907" rIns="83814" bIns="41907">
+              <a:spAutoFit/>
+            </a:bodyPr>
+            <a:lstStyle>
+              <a:lvl1pPr defTabSz="4389438" eaLnBrk="0" hangingPunct="0">
+                <a:defRPr sz="2200">
+                  <a:solidFill>
+                    <a:schemeClr val="tx1"/>
+                  </a:solidFill>
+                  <a:latin typeface="Arial" charset="0"/>
+                </a:defRPr>
+              </a:lvl1pPr>
+              <a:lvl2pPr marL="742950" indent="-285750" defTabSz="4389438" eaLnBrk="0" hangingPunct="0">
+                <a:defRPr sz="2200">
+                  <a:solidFill>
+                    <a:schemeClr val="tx1"/>
+                  </a:solidFill>
+                  <a:latin typeface="Arial" charset="0"/>
+                </a:defRPr>
+              </a:lvl2pPr>
+              <a:lvl3pPr marL="1143000" indent="-228600" defTabSz="4389438" eaLnBrk="0" hangingPunct="0">
+                <a:defRPr sz="2200">
+                  <a:solidFill>
+                    <a:schemeClr val="tx1"/>
+                  </a:solidFill>
+                  <a:latin typeface="Arial" charset="0"/>
+                </a:defRPr>
+              </a:lvl3pPr>
+              <a:lvl4pPr marL="1600200" indent="-228600" defTabSz="4389438" eaLnBrk="0" hangingPunct="0">
+                <a:defRPr sz="2200">
+                  <a:solidFill>
+                    <a:schemeClr val="tx1"/>
+                  </a:solidFill>
+                  <a:latin typeface="Arial" charset="0"/>
+                </a:defRPr>
+              </a:lvl4pPr>
+              <a:lvl5pPr marL="2057400" indent="-228600" defTabSz="4389438" eaLnBrk="0" hangingPunct="0">
+                <a:defRPr sz="2200">
+                  <a:solidFill>
+                    <a:schemeClr val="tx1"/>
+                  </a:solidFill>
+                  <a:latin typeface="Arial" charset="0"/>
+                </a:defRPr>
+              </a:lvl5pPr>
+              <a:lvl6pPr marL="2514600" indent="-228600" defTabSz="4389438" eaLnBrk="0" fontAlgn="base" hangingPunct="0">
+                <a:spcBef>
+                  <a:spcPct val="0"/>
+                </a:spcBef>
+                <a:spcAft>
+                  <a:spcPct val="0"/>
+                </a:spcAft>
+                <a:defRPr sz="2200">
+                  <a:solidFill>
+                    <a:schemeClr val="tx1"/>
+                  </a:solidFill>
+                  <a:latin typeface="Arial" charset="0"/>
+                </a:defRPr>
+              </a:lvl6pPr>
+              <a:lvl7pPr marL="2971800" indent="-228600" defTabSz="4389438" eaLnBrk="0" fontAlgn="base" hangingPunct="0">
+                <a:spcBef>
+                  <a:spcPct val="0"/>
+                </a:spcBef>
+                <a:spcAft>
+                  <a:spcPct val="0"/>
+                </a:spcAft>
+                <a:defRPr sz="2200">
+                  <a:solidFill>
+                    <a:schemeClr val="tx1"/>
+                  </a:solidFill>
+                  <a:latin typeface="Arial" charset="0"/>
+                </a:defRPr>
+              </a:lvl7pPr>
+              <a:lvl8pPr marL="3429000" indent="-228600" defTabSz="4389438" eaLnBrk="0" fontAlgn="base" hangingPunct="0">
+                <a:spcBef>
+                  <a:spcPct val="0"/>
+                </a:spcBef>
+                <a:spcAft>
+                  <a:spcPct val="0"/>
+                </a:spcAft>
+                <a:defRPr sz="2200">
+                  <a:solidFill>
+                    <a:schemeClr val="tx1"/>
+                  </a:solidFill>
+                  <a:latin typeface="Arial" charset="0"/>
+                </a:defRPr>
+              </a:lvl8pPr>
+              <a:lvl9pPr marL="3886200" indent="-228600" defTabSz="4389438" eaLnBrk="0" fontAlgn="base" hangingPunct="0">
+                <a:spcBef>
+                  <a:spcPct val="0"/>
+                </a:spcBef>
+                <a:spcAft>
+                  <a:spcPct val="0"/>
+                </a:spcAft>
+                <a:defRPr sz="2200">
+                  <a:solidFill>
+                    <a:schemeClr val="tx1"/>
+                  </a:solidFill>
+                  <a:latin typeface="Arial" charset="0"/>
+                </a:defRPr>
+              </a:lvl9pPr>
+            </a:lstStyle>
+            <a:p>
+              <a:pPr eaLnBrk="1" hangingPunct="1"/>
+              <a:r>
+                <a:rPr lang="en-US" sz="1600" dirty="0">
+                  <a:latin typeface="Avenir Book" panose="02000503020000020003" pitchFamily="2" charset="0"/>
+                  <a:ea typeface="Cambria Math" panose="02040503050406030204" pitchFamily="18" charset="0"/>
+                </a:rPr>
+                <a:t>4a</a:t>
+              </a:r>
+              <a:endParaRPr lang="en-US" sz="2800" dirty="0">
+                <a:latin typeface="Avenir Book" panose="02000503020000020003" pitchFamily="2" charset="0"/>
+                <a:ea typeface="Cambria Math" panose="02040503050406030204" pitchFamily="18" charset="0"/>
+              </a:endParaRPr>
+            </a:p>
+          </p:txBody>
+        </p:sp>
+        <p:sp>
+          <p:nvSpPr>
+            <p:cNvPr id="48" name="Text Box 181">
+              <a:extLst>
+                <a:ext uri="{FF2B5EF4-FFF2-40B4-BE49-F238E27FC236}">
+                  <a16:creationId xmlns:a16="http://schemas.microsoft.com/office/drawing/2014/main" id="{43F875F2-F64E-8240-B968-D1F4E45C21D0}"/>
+                </a:ext>
+              </a:extLst>
+            </p:cNvPr>
+            <p:cNvSpPr txBox="1">
+              <a:spLocks noChangeArrowheads="1"/>
+            </p:cNvSpPr>
+            <p:nvPr/>
+          </p:nvSpPr>
+          <p:spPr bwMode="auto">
+            <a:xfrm>
+              <a:off x="19368199" y="29846017"/>
+              <a:ext cx="578359" cy="327730"/>
+            </a:xfrm>
+            <a:prstGeom prst="rect">
+              <a:avLst/>
+            </a:prstGeom>
+            <a:noFill/>
+            <a:ln>
+              <a:noFill/>
+            </a:ln>
+            <a:effectLst/>
+            <a:extLst>
+              <a:ext uri="{909E8E84-426E-40DD-AFC4-6F175D3DCCD1}">
+                <a14:hiddenFill xmlns:a14="http://schemas.microsoft.com/office/drawing/2010/main">
+                  <a:solidFill>
+                    <a:schemeClr val="accent1"/>
+                  </a:solidFill>
+                </a14:hiddenFill>
+              </a:ext>
+              <a:ext uri="{91240B29-F687-4F45-9708-019B960494DF}">
+                <a14:hiddenLine xmlns:a14="http://schemas.microsoft.com/office/drawing/2010/main" w="9525">
+                  <a:solidFill>
+                    <a:schemeClr val="tx1"/>
+                  </a:solidFill>
+                  <a:miter lim="800000"/>
+                  <a:headEnd/>
+                  <a:tailEnd/>
+                </a14:hiddenLine>
+              </a:ext>
+              <a:ext uri="{AF507438-7753-43E0-B8FC-AC1667EBCBE1}">
+                <a14:hiddenEffects xmlns:a14="http://schemas.microsoft.com/office/drawing/2010/main">
+                  <a:effectLst>
+                    <a:outerShdw dist="35921" dir="2700000" algn="ctr" rotWithShape="0">
+                      <a:schemeClr val="bg2"/>
+                    </a:outerShdw>
+                  </a:effectLst>
+                </a14:hiddenEffects>
+              </a:ext>
+            </a:extLst>
+          </p:spPr>
+          <p:txBody>
+            <a:bodyPr wrap="square" lIns="83814" tIns="41907" rIns="83814" bIns="41907">
+              <a:spAutoFit/>
+            </a:bodyPr>
+            <a:lstStyle>
+              <a:lvl1pPr defTabSz="4389438" eaLnBrk="0" hangingPunct="0">
+                <a:defRPr sz="2200">
+                  <a:solidFill>
+                    <a:schemeClr val="tx1"/>
+                  </a:solidFill>
+                  <a:latin typeface="Arial" charset="0"/>
+                </a:defRPr>
+              </a:lvl1pPr>
+              <a:lvl2pPr marL="742950" indent="-285750" defTabSz="4389438" eaLnBrk="0" hangingPunct="0">
+                <a:defRPr sz="2200">
+                  <a:solidFill>
+                    <a:schemeClr val="tx1"/>
+                  </a:solidFill>
+                  <a:latin typeface="Arial" charset="0"/>
+                </a:defRPr>
+              </a:lvl2pPr>
+              <a:lvl3pPr marL="1143000" indent="-228600" defTabSz="4389438" eaLnBrk="0" hangingPunct="0">
+                <a:defRPr sz="2200">
+                  <a:solidFill>
+                    <a:schemeClr val="tx1"/>
+                  </a:solidFill>
+                  <a:latin typeface="Arial" charset="0"/>
+                </a:defRPr>
+              </a:lvl3pPr>
+              <a:lvl4pPr marL="1600200" indent="-228600" defTabSz="4389438" eaLnBrk="0" hangingPunct="0">
+                <a:defRPr sz="2200">
+                  <a:solidFill>
+                    <a:schemeClr val="tx1"/>
+                  </a:solidFill>
+                  <a:latin typeface="Arial" charset="0"/>
+                </a:defRPr>
+              </a:lvl4pPr>
+              <a:lvl5pPr marL="2057400" indent="-228600" defTabSz="4389438" eaLnBrk="0" hangingPunct="0">
+                <a:defRPr sz="2200">
+                  <a:solidFill>
+                    <a:schemeClr val="tx1"/>
+                  </a:solidFill>
+                  <a:latin typeface="Arial" charset="0"/>
+                </a:defRPr>
+              </a:lvl5pPr>
+              <a:lvl6pPr marL="2514600" indent="-228600" defTabSz="4389438" eaLnBrk="0" fontAlgn="base" hangingPunct="0">
+                <a:spcBef>
+                  <a:spcPct val="0"/>
+                </a:spcBef>
+                <a:spcAft>
+                  <a:spcPct val="0"/>
+                </a:spcAft>
+                <a:defRPr sz="2200">
+                  <a:solidFill>
+                    <a:schemeClr val="tx1"/>
+                  </a:solidFill>
+                  <a:latin typeface="Arial" charset="0"/>
+                </a:defRPr>
+              </a:lvl6pPr>
+              <a:lvl7pPr marL="2971800" indent="-228600" defTabSz="4389438" eaLnBrk="0" fontAlgn="base" hangingPunct="0">
+                <a:spcBef>
+                  <a:spcPct val="0"/>
+                </a:spcBef>
+                <a:spcAft>
+                  <a:spcPct val="0"/>
+                </a:spcAft>
+                <a:defRPr sz="2200">
+                  <a:solidFill>
+                    <a:schemeClr val="tx1"/>
+                  </a:solidFill>
+                  <a:latin typeface="Arial" charset="0"/>
+                </a:defRPr>
+              </a:lvl7pPr>
+              <a:lvl8pPr marL="3429000" indent="-228600" defTabSz="4389438" eaLnBrk="0" fontAlgn="base" hangingPunct="0">
+                <a:spcBef>
+                  <a:spcPct val="0"/>
+                </a:spcBef>
+                <a:spcAft>
+                  <a:spcPct val="0"/>
+                </a:spcAft>
+                <a:defRPr sz="2200">
+                  <a:solidFill>
+                    <a:schemeClr val="tx1"/>
+                  </a:solidFill>
+                  <a:latin typeface="Arial" charset="0"/>
+                </a:defRPr>
+              </a:lvl8pPr>
+              <a:lvl9pPr marL="3886200" indent="-228600" defTabSz="4389438" eaLnBrk="0" fontAlgn="base" hangingPunct="0">
+                <a:spcBef>
+                  <a:spcPct val="0"/>
+                </a:spcBef>
+                <a:spcAft>
+                  <a:spcPct val="0"/>
+                </a:spcAft>
+                <a:defRPr sz="2200">
+                  <a:solidFill>
+                    <a:schemeClr val="tx1"/>
+                  </a:solidFill>
+                  <a:latin typeface="Arial" charset="0"/>
+                </a:defRPr>
+              </a:lvl9pPr>
+            </a:lstStyle>
+            <a:p>
+              <a:pPr eaLnBrk="1" hangingPunct="1"/>
+              <a:r>
+                <a:rPr lang="en-US" sz="1600" dirty="0">
+                  <a:latin typeface="Avenir Book" panose="02000503020000020003" pitchFamily="2" charset="0"/>
+                  <a:ea typeface="Cambria Math" panose="02040503050406030204" pitchFamily="18" charset="0"/>
+                </a:rPr>
+                <a:t>4b</a:t>
+              </a:r>
+              <a:endParaRPr lang="en-US" sz="2800" dirty="0">
+                <a:latin typeface="Avenir Book" panose="02000503020000020003" pitchFamily="2" charset="0"/>
+                <a:ea typeface="Cambria Math" panose="02040503050406030204" pitchFamily="18" charset="0"/>
+              </a:endParaRPr>
+            </a:p>
+          </p:txBody>
+        </p:sp>
+      </p:grpSp>
+      <p:grpSp>
+        <p:nvGrpSpPr>
+          <p:cNvPr id="28" name="Group 27">
+            <a:extLst>
+              <a:ext uri="{FF2B5EF4-FFF2-40B4-BE49-F238E27FC236}">
+                <a16:creationId xmlns:a16="http://schemas.microsoft.com/office/drawing/2014/main" id="{2A6F6C47-C66A-FD48-AA14-004CEEBAE924}"/>
+              </a:ext>
+            </a:extLst>
+          </p:cNvPr>
+          <p:cNvGrpSpPr/>
+          <p:nvPr/>
+        </p:nvGrpSpPr>
+        <p:grpSpPr>
+          <a:xfrm>
+            <a:off x="17626813" y="23390899"/>
+            <a:ext cx="4937760" cy="2054936"/>
+            <a:chOff x="15625268" y="29069201"/>
+            <a:chExt cx="4937760" cy="2054936"/>
+          </a:xfrm>
+        </p:grpSpPr>
+        <p:pic>
+          <p:nvPicPr>
+            <p:cNvPr id="54" name="Content Placeholder 6" descr="enzymes&#10;">
+              <a:extLst>
+                <a:ext uri="{FF2B5EF4-FFF2-40B4-BE49-F238E27FC236}">
+                  <a16:creationId xmlns:a16="http://schemas.microsoft.com/office/drawing/2014/main" id="{6E4D01AC-45E2-0649-AC76-F54CF66981D9}"/>
+                </a:ext>
+              </a:extLst>
+            </p:cNvPr>
+            <p:cNvPicPr/>
+            <p:nvPr/>
+          </p:nvPicPr>
+          <p:blipFill rotWithShape="1">
+            <a:blip r:embed="rId9">
+              <a:extLst>
+                <a:ext uri="{28A0092B-C50C-407E-A947-70E740481C1C}">
+                  <a14:useLocalDpi xmlns:a14="http://schemas.microsoft.com/office/drawing/2010/main" val="0"/>
+                </a:ext>
+              </a:extLst>
+            </a:blip>
+            <a:srcRect b="61861"/>
+            <a:stretch/>
+          </p:blipFill>
+          <p:spPr>
+            <a:xfrm>
+              <a:off x="15625268" y="29069201"/>
+              <a:ext cx="4937760" cy="1412039"/>
+            </a:xfrm>
+            <a:prstGeom prst="rect">
+              <a:avLst/>
+            </a:prstGeom>
+            <a:ln>
+              <a:solidFill>
+                <a:schemeClr val="tx1"/>
+              </a:solidFill>
+            </a:ln>
+          </p:spPr>
+        </p:pic>
+        <p:sp>
+          <p:nvSpPr>
+            <p:cNvPr id="55" name="Text Box 181">
+              <a:extLst>
+                <a:ext uri="{FF2B5EF4-FFF2-40B4-BE49-F238E27FC236}">
+                  <a16:creationId xmlns:a16="http://schemas.microsoft.com/office/drawing/2014/main" id="{CC5CFF8C-3EE4-CF4D-8169-FF1B7AE0221C}"/>
+                </a:ext>
+              </a:extLst>
+            </p:cNvPr>
+            <p:cNvSpPr txBox="1">
+              <a:spLocks noChangeArrowheads="1"/>
+            </p:cNvSpPr>
+            <p:nvPr/>
+          </p:nvSpPr>
+          <p:spPr bwMode="auto">
+            <a:xfrm>
+              <a:off x="15625268" y="30731728"/>
+              <a:ext cx="4937760" cy="392409"/>
+            </a:xfrm>
+            <a:prstGeom prst="rect">
+              <a:avLst/>
+            </a:prstGeom>
+            <a:noFill/>
+            <a:ln>
+              <a:noFill/>
+            </a:ln>
+            <a:effectLst/>
+            <a:extLst>
+              <a:ext uri="{909E8E84-426E-40DD-AFC4-6F175D3DCCD1}">
+                <a14:hiddenFill xmlns:a14="http://schemas.microsoft.com/office/drawing/2010/main">
+                  <a:solidFill>
+                    <a:schemeClr val="accent1"/>
+                  </a:solidFill>
+                </a14:hiddenFill>
+              </a:ext>
+              <a:ext uri="{91240B29-F687-4F45-9708-019B960494DF}">
+                <a14:hiddenLine xmlns:a14="http://schemas.microsoft.com/office/drawing/2010/main" w="9525">
+                  <a:solidFill>
+                    <a:schemeClr val="tx1"/>
+                  </a:solidFill>
+                  <a:miter lim="800000"/>
+                  <a:headEnd/>
+                  <a:tailEnd/>
+                </a14:hiddenLine>
+              </a:ext>
+              <a:ext uri="{AF507438-7753-43E0-B8FC-AC1667EBCBE1}">
+                <a14:hiddenEffects xmlns:a14="http://schemas.microsoft.com/office/drawing/2010/main">
+                  <a:effectLst>
+                    <a:outerShdw dist="35921" dir="2700000" algn="ctr" rotWithShape="0">
+                      <a:schemeClr val="bg2"/>
+                    </a:outerShdw>
+                  </a:effectLst>
+                </a14:hiddenEffects>
+              </a:ext>
+            </a:extLst>
+          </p:spPr>
+          <p:txBody>
+            <a:bodyPr wrap="square" lIns="83814" tIns="41907" rIns="83814" bIns="41907">
+              <a:spAutoFit/>
+            </a:bodyPr>
+            <a:lstStyle>
+              <a:lvl1pPr defTabSz="4389438" eaLnBrk="0" hangingPunct="0">
+                <a:defRPr sz="2200">
+                  <a:solidFill>
+                    <a:schemeClr val="tx1"/>
+                  </a:solidFill>
+                  <a:latin typeface="Arial" charset="0"/>
+                </a:defRPr>
+              </a:lvl1pPr>
+              <a:lvl2pPr marL="742950" indent="-285750" defTabSz="4389438" eaLnBrk="0" hangingPunct="0">
+                <a:defRPr sz="2200">
+                  <a:solidFill>
+                    <a:schemeClr val="tx1"/>
+                  </a:solidFill>
+                  <a:latin typeface="Arial" charset="0"/>
+                </a:defRPr>
+              </a:lvl2pPr>
+              <a:lvl3pPr marL="1143000" indent="-228600" defTabSz="4389438" eaLnBrk="0" hangingPunct="0">
+                <a:defRPr sz="2200">
+                  <a:solidFill>
+                    <a:schemeClr val="tx1"/>
+                  </a:solidFill>
+                  <a:latin typeface="Arial" charset="0"/>
+                </a:defRPr>
+              </a:lvl3pPr>
+              <a:lvl4pPr marL="1600200" indent="-228600" defTabSz="4389438" eaLnBrk="0" hangingPunct="0">
+                <a:defRPr sz="2200">
+                  <a:solidFill>
+                    <a:schemeClr val="tx1"/>
+                  </a:solidFill>
+                  <a:latin typeface="Arial" charset="0"/>
+                </a:defRPr>
+              </a:lvl4pPr>
+              <a:lvl5pPr marL="2057400" indent="-228600" defTabSz="4389438" eaLnBrk="0" hangingPunct="0">
+                <a:defRPr sz="2200">
+                  <a:solidFill>
+                    <a:schemeClr val="tx1"/>
+                  </a:solidFill>
+                  <a:latin typeface="Arial" charset="0"/>
+                </a:defRPr>
+              </a:lvl5pPr>
+              <a:lvl6pPr marL="2514600" indent="-228600" defTabSz="4389438" eaLnBrk="0" fontAlgn="base" hangingPunct="0">
+                <a:spcBef>
+                  <a:spcPct val="0"/>
+                </a:spcBef>
+                <a:spcAft>
+                  <a:spcPct val="0"/>
+                </a:spcAft>
+                <a:defRPr sz="2200">
+                  <a:solidFill>
+                    <a:schemeClr val="tx1"/>
+                  </a:solidFill>
+                  <a:latin typeface="Arial" charset="0"/>
+                </a:defRPr>
+              </a:lvl6pPr>
+              <a:lvl7pPr marL="2971800" indent="-228600" defTabSz="4389438" eaLnBrk="0" fontAlgn="base" hangingPunct="0">
+                <a:spcBef>
+                  <a:spcPct val="0"/>
+                </a:spcBef>
+                <a:spcAft>
+                  <a:spcPct val="0"/>
+                </a:spcAft>
+                <a:defRPr sz="2200">
+                  <a:solidFill>
+                    <a:schemeClr val="tx1"/>
+                  </a:solidFill>
+                  <a:latin typeface="Arial" charset="0"/>
+                </a:defRPr>
+              </a:lvl7pPr>
+              <a:lvl8pPr marL="3429000" indent="-228600" defTabSz="4389438" eaLnBrk="0" fontAlgn="base" hangingPunct="0">
+                <a:spcBef>
+                  <a:spcPct val="0"/>
+                </a:spcBef>
+                <a:spcAft>
+                  <a:spcPct val="0"/>
+                </a:spcAft>
+                <a:defRPr sz="2200">
+                  <a:solidFill>
+                    <a:schemeClr val="tx1"/>
+                  </a:solidFill>
+                  <a:latin typeface="Arial" charset="0"/>
+                </a:defRPr>
+              </a:lvl8pPr>
+              <a:lvl9pPr marL="3886200" indent="-228600" defTabSz="4389438" eaLnBrk="0" fontAlgn="base" hangingPunct="0">
+                <a:spcBef>
+                  <a:spcPct val="0"/>
+                </a:spcBef>
+                <a:spcAft>
+                  <a:spcPct val="0"/>
+                </a:spcAft>
+                <a:defRPr sz="2200">
+                  <a:solidFill>
+                    <a:schemeClr val="tx1"/>
+                  </a:solidFill>
+                  <a:latin typeface="Arial" charset="0"/>
+                </a:defRPr>
+              </a:lvl9pPr>
+            </a:lstStyle>
+            <a:p>
+              <a:pPr eaLnBrk="1" hangingPunct="1"/>
+              <a:r>
+                <a:rPr lang="en-US" sz="2000" dirty="0">
+                  <a:latin typeface="Avenir Book" panose="02000503020000020003" pitchFamily="2" charset="0"/>
+                  <a:ea typeface="Cambria Math" panose="02040503050406030204" pitchFamily="18" charset="0"/>
+                </a:rPr>
+                <a:t>Figure 3. Chosen Enzymatic Mechanism.</a:t>
+              </a:r>
+            </a:p>
+          </p:txBody>
+        </p:sp>
+      </p:grpSp>
+      <p:grpSp>
+        <p:nvGrpSpPr>
+          <p:cNvPr id="29" name="Group 28">
+            <a:extLst>
+              <a:ext uri="{FF2B5EF4-FFF2-40B4-BE49-F238E27FC236}">
+                <a16:creationId xmlns:a16="http://schemas.microsoft.com/office/drawing/2014/main" id="{DC88ABCA-27CB-B043-BBCE-43110FD448E0}"/>
+              </a:ext>
+            </a:extLst>
+          </p:cNvPr>
+          <p:cNvGrpSpPr/>
+          <p:nvPr/>
+        </p:nvGrpSpPr>
+        <p:grpSpPr>
+          <a:xfrm>
+            <a:off x="14920606" y="29867815"/>
+            <a:ext cx="9913704" cy="5427243"/>
+            <a:chOff x="14754640" y="25375156"/>
+            <a:chExt cx="9913704" cy="5142743"/>
+          </a:xfrm>
+        </p:grpSpPr>
+        <p:pic>
+          <p:nvPicPr>
+            <p:cNvPr id="56" name="Picture 55" descr="A close up of a map&#10;&#10;Description automatically generated">
+              <a:extLst>
+                <a:ext uri="{FF2B5EF4-FFF2-40B4-BE49-F238E27FC236}">
+                  <a16:creationId xmlns:a16="http://schemas.microsoft.com/office/drawing/2014/main" id="{C9656AC4-33DD-DF40-B58D-1CF0B43DC12F}"/>
+                </a:ext>
+              </a:extLst>
+            </p:cNvPr>
+            <p:cNvPicPr>
+              <a:picLocks noChangeAspect="1"/>
+            </p:cNvPicPr>
+            <p:nvPr/>
+          </p:nvPicPr>
+          <p:blipFill>
+            <a:blip r:embed="rId10"/>
+            <a:stretch>
+              <a:fillRect/>
+            </a:stretch>
+          </p:blipFill>
+          <p:spPr>
+            <a:xfrm>
+              <a:off x="14858940" y="25799246"/>
+              <a:ext cx="4114800" cy="3200400"/>
+            </a:xfrm>
+            <a:prstGeom prst="rect">
+              <a:avLst/>
+            </a:prstGeom>
+          </p:spPr>
+        </p:pic>
+        <p:pic>
+          <p:nvPicPr>
+            <p:cNvPr id="57" name="Picture 56" descr="A close up of a map&#10;&#10;Description automatically generated">
+              <a:extLst>
+                <a:ext uri="{FF2B5EF4-FFF2-40B4-BE49-F238E27FC236}">
+                  <a16:creationId xmlns:a16="http://schemas.microsoft.com/office/drawing/2014/main" id="{B34CAA61-8FA0-BE46-AB38-AEDA279824F7}"/>
+                </a:ext>
+              </a:extLst>
+            </p:cNvPr>
+            <p:cNvPicPr>
+              <a:picLocks noChangeAspect="1"/>
+            </p:cNvPicPr>
+            <p:nvPr/>
+          </p:nvPicPr>
+          <p:blipFill>
+            <a:blip r:embed="rId11"/>
+            <a:stretch>
+              <a:fillRect/>
+            </a:stretch>
+          </p:blipFill>
+          <p:spPr>
+            <a:xfrm>
+              <a:off x="19827620" y="25799246"/>
+              <a:ext cx="4114800" cy="3200400"/>
+            </a:xfrm>
+            <a:prstGeom prst="rect">
+              <a:avLst/>
+            </a:prstGeom>
+          </p:spPr>
+        </p:pic>
+        <p:sp>
+          <p:nvSpPr>
+            <p:cNvPr id="58" name="Text Box 181">
+              <a:extLst>
+                <a:ext uri="{FF2B5EF4-FFF2-40B4-BE49-F238E27FC236}">
+                  <a16:creationId xmlns:a16="http://schemas.microsoft.com/office/drawing/2014/main" id="{8851B0A8-0533-5543-802F-3898F2066D40}"/>
+                </a:ext>
+              </a:extLst>
+            </p:cNvPr>
+            <p:cNvSpPr txBox="1">
+              <a:spLocks noChangeArrowheads="1"/>
+            </p:cNvSpPr>
+            <p:nvPr/>
+          </p:nvSpPr>
+          <p:spPr bwMode="auto">
+            <a:xfrm>
+              <a:off x="14934715" y="29325271"/>
+              <a:ext cx="9733629" cy="1192628"/>
+            </a:xfrm>
+            <a:prstGeom prst="rect">
+              <a:avLst/>
+            </a:prstGeom>
+            <a:noFill/>
+            <a:ln>
+              <a:noFill/>
+            </a:ln>
+            <a:effectLst/>
+            <a:extLst>
+              <a:ext uri="{909E8E84-426E-40DD-AFC4-6F175D3DCCD1}">
+                <a14:hiddenFill xmlns:a14="http://schemas.microsoft.com/office/drawing/2010/main">
+                  <a:solidFill>
+                    <a:schemeClr val="accent1"/>
+                  </a:solidFill>
+                </a14:hiddenFill>
+              </a:ext>
+              <a:ext uri="{91240B29-F687-4F45-9708-019B960494DF}">
+                <a14:hiddenLine xmlns:a14="http://schemas.microsoft.com/office/drawing/2010/main" w="9525">
+                  <a:solidFill>
+                    <a:schemeClr val="tx1"/>
+                  </a:solidFill>
+                  <a:miter lim="800000"/>
+                  <a:headEnd/>
+                  <a:tailEnd/>
+                </a14:hiddenLine>
+              </a:ext>
+              <a:ext uri="{AF507438-7753-43E0-B8FC-AC1667EBCBE1}">
+                <a14:hiddenEffects xmlns:a14="http://schemas.microsoft.com/office/drawing/2010/main">
+                  <a:effectLst>
+                    <a:outerShdw dist="35921" dir="2700000" algn="ctr" rotWithShape="0">
+                      <a:schemeClr val="bg2"/>
+                    </a:outerShdw>
+                  </a:effectLst>
+                </a14:hiddenEffects>
+              </a:ext>
+            </a:extLst>
+          </p:spPr>
+          <p:txBody>
+            <a:bodyPr wrap="square" lIns="83814" tIns="41907" rIns="83814" bIns="41907">
+              <a:spAutoFit/>
+            </a:bodyPr>
+            <a:lstStyle>
+              <a:lvl1pPr defTabSz="4389438" eaLnBrk="0" hangingPunct="0">
+                <a:defRPr sz="2200">
+                  <a:solidFill>
+                    <a:schemeClr val="tx1"/>
+                  </a:solidFill>
+                  <a:latin typeface="Arial" charset="0"/>
+                </a:defRPr>
+              </a:lvl1pPr>
+              <a:lvl2pPr marL="742950" indent="-285750" defTabSz="4389438" eaLnBrk="0" hangingPunct="0">
+                <a:defRPr sz="2200">
+                  <a:solidFill>
+                    <a:schemeClr val="tx1"/>
+                  </a:solidFill>
+                  <a:latin typeface="Arial" charset="0"/>
+                </a:defRPr>
+              </a:lvl2pPr>
+              <a:lvl3pPr marL="1143000" indent="-228600" defTabSz="4389438" eaLnBrk="0" hangingPunct="0">
+                <a:defRPr sz="2200">
+                  <a:solidFill>
+                    <a:schemeClr val="tx1"/>
+                  </a:solidFill>
+                  <a:latin typeface="Arial" charset="0"/>
+                </a:defRPr>
+              </a:lvl3pPr>
+              <a:lvl4pPr marL="1600200" indent="-228600" defTabSz="4389438" eaLnBrk="0" hangingPunct="0">
+                <a:defRPr sz="2200">
+                  <a:solidFill>
+                    <a:schemeClr val="tx1"/>
+                  </a:solidFill>
+                  <a:latin typeface="Arial" charset="0"/>
+                </a:defRPr>
+              </a:lvl4pPr>
+              <a:lvl5pPr marL="2057400" indent="-228600" defTabSz="4389438" eaLnBrk="0" hangingPunct="0">
+                <a:defRPr sz="2200">
+                  <a:solidFill>
+                    <a:schemeClr val="tx1"/>
+                  </a:solidFill>
+                  <a:latin typeface="Arial" charset="0"/>
+                </a:defRPr>
+              </a:lvl5pPr>
+              <a:lvl6pPr marL="2514600" indent="-228600" defTabSz="4389438" eaLnBrk="0" fontAlgn="base" hangingPunct="0">
+                <a:spcBef>
+                  <a:spcPct val="0"/>
+                </a:spcBef>
+                <a:spcAft>
+                  <a:spcPct val="0"/>
+                </a:spcAft>
+                <a:defRPr sz="2200">
+                  <a:solidFill>
+                    <a:schemeClr val="tx1"/>
+                  </a:solidFill>
+                  <a:latin typeface="Arial" charset="0"/>
+                </a:defRPr>
+              </a:lvl6pPr>
+              <a:lvl7pPr marL="2971800" indent="-228600" defTabSz="4389438" eaLnBrk="0" fontAlgn="base" hangingPunct="0">
+                <a:spcBef>
+                  <a:spcPct val="0"/>
+                </a:spcBef>
+                <a:spcAft>
+                  <a:spcPct val="0"/>
+                </a:spcAft>
+                <a:defRPr sz="2200">
+                  <a:solidFill>
+                    <a:schemeClr val="tx1"/>
+                  </a:solidFill>
+                  <a:latin typeface="Arial" charset="0"/>
+                </a:defRPr>
+              </a:lvl7pPr>
+              <a:lvl8pPr marL="3429000" indent="-228600" defTabSz="4389438" eaLnBrk="0" fontAlgn="base" hangingPunct="0">
+                <a:spcBef>
+                  <a:spcPct val="0"/>
+                </a:spcBef>
+                <a:spcAft>
+                  <a:spcPct val="0"/>
+                </a:spcAft>
+                <a:defRPr sz="2200">
+                  <a:solidFill>
+                    <a:schemeClr val="tx1"/>
+                  </a:solidFill>
+                  <a:latin typeface="Arial" charset="0"/>
+                </a:defRPr>
+              </a:lvl8pPr>
+              <a:lvl9pPr marL="3886200" indent="-228600" defTabSz="4389438" eaLnBrk="0" fontAlgn="base" hangingPunct="0">
+                <a:spcBef>
+                  <a:spcPct val="0"/>
+                </a:spcBef>
+                <a:spcAft>
+                  <a:spcPct val="0"/>
+                </a:spcAft>
+                <a:defRPr sz="2200">
+                  <a:solidFill>
+                    <a:schemeClr val="tx1"/>
+                  </a:solidFill>
+                  <a:latin typeface="Arial" charset="0"/>
+                </a:defRPr>
+              </a:lvl9pPr>
+            </a:lstStyle>
+            <a:p>
+              <a:pPr eaLnBrk="1" hangingPunct="1"/>
+              <a:r>
+                <a:rPr lang="en-US" sz="2400" dirty="0">
+                  <a:latin typeface="Avenir Book" panose="02000503020000020003" pitchFamily="2" charset="0"/>
+                  <a:ea typeface="Cambria Math" panose="02040503050406030204" pitchFamily="18" charset="0"/>
+                </a:rPr>
+                <a:t>Figure 5. Simulations of the ATP synthase model. Without the proton pump, there is not enough regeneration (5a). When the proton gradient is maintained, we see a higher steady state of ATP (5b).</a:t>
+              </a:r>
+            </a:p>
+          </p:txBody>
+        </p:sp>
+        <p:sp>
+          <p:nvSpPr>
+            <p:cNvPr id="59" name="Text Box 181">
+              <a:extLst>
+                <a:ext uri="{FF2B5EF4-FFF2-40B4-BE49-F238E27FC236}">
+                  <a16:creationId xmlns:a16="http://schemas.microsoft.com/office/drawing/2014/main" id="{E112BC73-C608-9548-AFBE-0BDE648CD0CE}"/>
+                </a:ext>
+              </a:extLst>
+            </p:cNvPr>
+            <p:cNvSpPr txBox="1">
+              <a:spLocks noChangeArrowheads="1"/>
+            </p:cNvSpPr>
+            <p:nvPr/>
+          </p:nvSpPr>
+          <p:spPr bwMode="auto">
+            <a:xfrm>
+              <a:off x="14754640" y="25375156"/>
+              <a:ext cx="578359" cy="327730"/>
+            </a:xfrm>
+            <a:prstGeom prst="rect">
+              <a:avLst/>
+            </a:prstGeom>
+            <a:noFill/>
+            <a:ln>
+              <a:noFill/>
+            </a:ln>
+            <a:effectLst/>
+            <a:extLst>
+              <a:ext uri="{909E8E84-426E-40DD-AFC4-6F175D3DCCD1}">
+                <a14:hiddenFill xmlns:a14="http://schemas.microsoft.com/office/drawing/2010/main">
+                  <a:solidFill>
+                    <a:schemeClr val="accent1"/>
+                  </a:solidFill>
+                </a14:hiddenFill>
+              </a:ext>
+              <a:ext uri="{91240B29-F687-4F45-9708-019B960494DF}">
+                <a14:hiddenLine xmlns:a14="http://schemas.microsoft.com/office/drawing/2010/main" w="9525">
+                  <a:solidFill>
+                    <a:schemeClr val="tx1"/>
+                  </a:solidFill>
+                  <a:miter lim="800000"/>
+                  <a:headEnd/>
+                  <a:tailEnd/>
+                </a14:hiddenLine>
+              </a:ext>
+              <a:ext uri="{AF507438-7753-43E0-B8FC-AC1667EBCBE1}">
+                <a14:hiddenEffects xmlns:a14="http://schemas.microsoft.com/office/drawing/2010/main">
+                  <a:effectLst>
+                    <a:outerShdw dist="35921" dir="2700000" algn="ctr" rotWithShape="0">
+                      <a:schemeClr val="bg2"/>
+                    </a:outerShdw>
+                  </a:effectLst>
+                </a14:hiddenEffects>
+              </a:ext>
+            </a:extLst>
+          </p:spPr>
+          <p:txBody>
+            <a:bodyPr wrap="square" lIns="83814" tIns="41907" rIns="83814" bIns="41907">
+              <a:spAutoFit/>
+            </a:bodyPr>
+            <a:lstStyle>
+              <a:lvl1pPr defTabSz="4389438" eaLnBrk="0" hangingPunct="0">
+                <a:defRPr sz="2200">
+                  <a:solidFill>
+                    <a:schemeClr val="tx1"/>
+                  </a:solidFill>
+                  <a:latin typeface="Arial" charset="0"/>
+                </a:defRPr>
+              </a:lvl1pPr>
+              <a:lvl2pPr marL="742950" indent="-285750" defTabSz="4389438" eaLnBrk="0" hangingPunct="0">
+                <a:defRPr sz="2200">
+                  <a:solidFill>
+                    <a:schemeClr val="tx1"/>
+                  </a:solidFill>
+                  <a:latin typeface="Arial" charset="0"/>
+                </a:defRPr>
+              </a:lvl2pPr>
+              <a:lvl3pPr marL="1143000" indent="-228600" defTabSz="4389438" eaLnBrk="0" hangingPunct="0">
+                <a:defRPr sz="2200">
+                  <a:solidFill>
+                    <a:schemeClr val="tx1"/>
+                  </a:solidFill>
+                  <a:latin typeface="Arial" charset="0"/>
+                </a:defRPr>
+              </a:lvl3pPr>
+              <a:lvl4pPr marL="1600200" indent="-228600" defTabSz="4389438" eaLnBrk="0" hangingPunct="0">
+                <a:defRPr sz="2200">
+                  <a:solidFill>
+                    <a:schemeClr val="tx1"/>
+                  </a:solidFill>
+                  <a:latin typeface="Arial" charset="0"/>
+                </a:defRPr>
+              </a:lvl4pPr>
+              <a:lvl5pPr marL="2057400" indent="-228600" defTabSz="4389438" eaLnBrk="0" hangingPunct="0">
+                <a:defRPr sz="2200">
+                  <a:solidFill>
+                    <a:schemeClr val="tx1"/>
+                  </a:solidFill>
+                  <a:latin typeface="Arial" charset="0"/>
+                </a:defRPr>
+              </a:lvl5pPr>
+              <a:lvl6pPr marL="2514600" indent="-228600" defTabSz="4389438" eaLnBrk="0" fontAlgn="base" hangingPunct="0">
+                <a:spcBef>
+                  <a:spcPct val="0"/>
+                </a:spcBef>
+                <a:spcAft>
+                  <a:spcPct val="0"/>
+                </a:spcAft>
+                <a:defRPr sz="2200">
+                  <a:solidFill>
+                    <a:schemeClr val="tx1"/>
+                  </a:solidFill>
+                  <a:latin typeface="Arial" charset="0"/>
+                </a:defRPr>
+              </a:lvl6pPr>
+              <a:lvl7pPr marL="2971800" indent="-228600" defTabSz="4389438" eaLnBrk="0" fontAlgn="base" hangingPunct="0">
+                <a:spcBef>
+                  <a:spcPct val="0"/>
+                </a:spcBef>
+                <a:spcAft>
+                  <a:spcPct val="0"/>
+                </a:spcAft>
+                <a:defRPr sz="2200">
+                  <a:solidFill>
+                    <a:schemeClr val="tx1"/>
+                  </a:solidFill>
+                  <a:latin typeface="Arial" charset="0"/>
+                </a:defRPr>
+              </a:lvl7pPr>
+              <a:lvl8pPr marL="3429000" indent="-228600" defTabSz="4389438" eaLnBrk="0" fontAlgn="base" hangingPunct="0">
+                <a:spcBef>
+                  <a:spcPct val="0"/>
+                </a:spcBef>
+                <a:spcAft>
+                  <a:spcPct val="0"/>
+                </a:spcAft>
+                <a:defRPr sz="2200">
+                  <a:solidFill>
+                    <a:schemeClr val="tx1"/>
+                  </a:solidFill>
+                  <a:latin typeface="Arial" charset="0"/>
+                </a:defRPr>
+              </a:lvl8pPr>
+              <a:lvl9pPr marL="3886200" indent="-228600" defTabSz="4389438" eaLnBrk="0" fontAlgn="base" hangingPunct="0">
+                <a:spcBef>
+                  <a:spcPct val="0"/>
+                </a:spcBef>
+                <a:spcAft>
+                  <a:spcPct val="0"/>
+                </a:spcAft>
+                <a:defRPr sz="2200">
+                  <a:solidFill>
+                    <a:schemeClr val="tx1"/>
+                  </a:solidFill>
+                  <a:latin typeface="Arial" charset="0"/>
+                </a:defRPr>
+              </a:lvl9pPr>
+            </a:lstStyle>
+            <a:p>
+              <a:pPr eaLnBrk="1" hangingPunct="1"/>
+              <a:r>
+                <a:rPr lang="en-US" sz="1600" dirty="0">
+                  <a:latin typeface="Avenir Book" panose="02000503020000020003" pitchFamily="2" charset="0"/>
+                  <a:ea typeface="Cambria Math" panose="02040503050406030204" pitchFamily="18" charset="0"/>
+                </a:rPr>
+                <a:t>5a</a:t>
+              </a:r>
+              <a:endParaRPr lang="en-US" sz="2800" dirty="0">
+                <a:latin typeface="Avenir Book" panose="02000503020000020003" pitchFamily="2" charset="0"/>
+                <a:ea typeface="Cambria Math" panose="02040503050406030204" pitchFamily="18" charset="0"/>
+              </a:endParaRPr>
+            </a:p>
+          </p:txBody>
+        </p:sp>
+        <p:sp>
+          <p:nvSpPr>
+            <p:cNvPr id="60" name="Text Box 181">
+              <a:extLst>
+                <a:ext uri="{FF2B5EF4-FFF2-40B4-BE49-F238E27FC236}">
+                  <a16:creationId xmlns:a16="http://schemas.microsoft.com/office/drawing/2014/main" id="{85B4C05B-461D-5E4A-A078-D4AC84A5E9ED}"/>
+                </a:ext>
+              </a:extLst>
+            </p:cNvPr>
+            <p:cNvSpPr txBox="1">
+              <a:spLocks noChangeArrowheads="1"/>
+            </p:cNvSpPr>
+            <p:nvPr/>
+          </p:nvSpPr>
+          <p:spPr bwMode="auto">
+            <a:xfrm>
+              <a:off x="19801529" y="25393951"/>
+              <a:ext cx="578359" cy="327730"/>
+            </a:xfrm>
+            <a:prstGeom prst="rect">
+              <a:avLst/>
+            </a:prstGeom>
+            <a:noFill/>
+            <a:ln>
+              <a:noFill/>
+            </a:ln>
+            <a:effectLst/>
+            <a:extLst>
+              <a:ext uri="{909E8E84-426E-40DD-AFC4-6F175D3DCCD1}">
+                <a14:hiddenFill xmlns:a14="http://schemas.microsoft.com/office/drawing/2010/main">
+                  <a:solidFill>
+                    <a:schemeClr val="accent1"/>
+                  </a:solidFill>
+                </a14:hiddenFill>
+              </a:ext>
+              <a:ext uri="{91240B29-F687-4F45-9708-019B960494DF}">
+                <a14:hiddenLine xmlns:a14="http://schemas.microsoft.com/office/drawing/2010/main" w="9525">
+                  <a:solidFill>
+                    <a:schemeClr val="tx1"/>
+                  </a:solidFill>
+                  <a:miter lim="800000"/>
+                  <a:headEnd/>
+                  <a:tailEnd/>
+                </a14:hiddenLine>
+              </a:ext>
+              <a:ext uri="{AF507438-7753-43E0-B8FC-AC1667EBCBE1}">
+                <a14:hiddenEffects xmlns:a14="http://schemas.microsoft.com/office/drawing/2010/main">
+                  <a:effectLst>
+                    <a:outerShdw dist="35921" dir="2700000" algn="ctr" rotWithShape="0">
+                      <a:schemeClr val="bg2"/>
+                    </a:outerShdw>
+                  </a:effectLst>
+                </a14:hiddenEffects>
+              </a:ext>
+            </a:extLst>
+          </p:spPr>
+          <p:txBody>
+            <a:bodyPr wrap="square" lIns="83814" tIns="41907" rIns="83814" bIns="41907">
+              <a:spAutoFit/>
+            </a:bodyPr>
+            <a:lstStyle>
+              <a:lvl1pPr defTabSz="4389438" eaLnBrk="0" hangingPunct="0">
+                <a:defRPr sz="2200">
+                  <a:solidFill>
+                    <a:schemeClr val="tx1"/>
+                  </a:solidFill>
+                  <a:latin typeface="Arial" charset="0"/>
+                </a:defRPr>
+              </a:lvl1pPr>
+              <a:lvl2pPr marL="742950" indent="-285750" defTabSz="4389438" eaLnBrk="0" hangingPunct="0">
+                <a:defRPr sz="2200">
+                  <a:solidFill>
+                    <a:schemeClr val="tx1"/>
+                  </a:solidFill>
+                  <a:latin typeface="Arial" charset="0"/>
+                </a:defRPr>
+              </a:lvl2pPr>
+              <a:lvl3pPr marL="1143000" indent="-228600" defTabSz="4389438" eaLnBrk="0" hangingPunct="0">
+                <a:defRPr sz="2200">
+                  <a:solidFill>
+                    <a:schemeClr val="tx1"/>
+                  </a:solidFill>
+                  <a:latin typeface="Arial" charset="0"/>
+                </a:defRPr>
+              </a:lvl3pPr>
+              <a:lvl4pPr marL="1600200" indent="-228600" defTabSz="4389438" eaLnBrk="0" hangingPunct="0">
+                <a:defRPr sz="2200">
+                  <a:solidFill>
+                    <a:schemeClr val="tx1"/>
+                  </a:solidFill>
+                  <a:latin typeface="Arial" charset="0"/>
+                </a:defRPr>
+              </a:lvl4pPr>
+              <a:lvl5pPr marL="2057400" indent="-228600" defTabSz="4389438" eaLnBrk="0" hangingPunct="0">
+                <a:defRPr sz="2200">
+                  <a:solidFill>
+                    <a:schemeClr val="tx1"/>
+                  </a:solidFill>
+                  <a:latin typeface="Arial" charset="0"/>
+                </a:defRPr>
+              </a:lvl5pPr>
+              <a:lvl6pPr marL="2514600" indent="-228600" defTabSz="4389438" eaLnBrk="0" fontAlgn="base" hangingPunct="0">
+                <a:spcBef>
+                  <a:spcPct val="0"/>
+                </a:spcBef>
+                <a:spcAft>
+                  <a:spcPct val="0"/>
+                </a:spcAft>
+                <a:defRPr sz="2200">
+                  <a:solidFill>
+                    <a:schemeClr val="tx1"/>
+                  </a:solidFill>
+                  <a:latin typeface="Arial" charset="0"/>
+                </a:defRPr>
+              </a:lvl6pPr>
+              <a:lvl7pPr marL="2971800" indent="-228600" defTabSz="4389438" eaLnBrk="0" fontAlgn="base" hangingPunct="0">
+                <a:spcBef>
+                  <a:spcPct val="0"/>
+                </a:spcBef>
+                <a:spcAft>
+                  <a:spcPct val="0"/>
+                </a:spcAft>
+                <a:defRPr sz="2200">
+                  <a:solidFill>
+                    <a:schemeClr val="tx1"/>
+                  </a:solidFill>
+                  <a:latin typeface="Arial" charset="0"/>
+                </a:defRPr>
+              </a:lvl7pPr>
+              <a:lvl8pPr marL="3429000" indent="-228600" defTabSz="4389438" eaLnBrk="0" fontAlgn="base" hangingPunct="0">
+                <a:spcBef>
+                  <a:spcPct val="0"/>
+                </a:spcBef>
+                <a:spcAft>
+                  <a:spcPct val="0"/>
+                </a:spcAft>
+                <a:defRPr sz="2200">
+                  <a:solidFill>
+                    <a:schemeClr val="tx1"/>
+                  </a:solidFill>
+                  <a:latin typeface="Arial" charset="0"/>
+                </a:defRPr>
+              </a:lvl8pPr>
+              <a:lvl9pPr marL="3886200" indent="-228600" defTabSz="4389438" eaLnBrk="0" fontAlgn="base" hangingPunct="0">
+                <a:spcBef>
+                  <a:spcPct val="0"/>
+                </a:spcBef>
+                <a:spcAft>
+                  <a:spcPct val="0"/>
+                </a:spcAft>
+                <a:defRPr sz="2200">
+                  <a:solidFill>
+                    <a:schemeClr val="tx1"/>
+                  </a:solidFill>
+                  <a:latin typeface="Arial" charset="0"/>
+                </a:defRPr>
+              </a:lvl9pPr>
+            </a:lstStyle>
+            <a:p>
+              <a:pPr eaLnBrk="1" hangingPunct="1"/>
+              <a:r>
+                <a:rPr lang="en-US" sz="1600" dirty="0">
+                  <a:latin typeface="Avenir Book" panose="02000503020000020003" pitchFamily="2" charset="0"/>
+                  <a:ea typeface="Cambria Math" panose="02040503050406030204" pitchFamily="18" charset="0"/>
+                </a:rPr>
+                <a:t>5b</a:t>
+              </a:r>
+              <a:endParaRPr lang="en-US" sz="2800" dirty="0">
+                <a:latin typeface="Avenir Book" panose="02000503020000020003" pitchFamily="2" charset="0"/>
+                <a:ea typeface="Cambria Math" panose="02040503050406030204" pitchFamily="18" charset="0"/>
+              </a:endParaRPr>
+            </a:p>
+          </p:txBody>
+        </p:sp>
+      </p:grpSp>
     </p:spTree>
     <p:extLst>
       <p:ext uri="{BB962C8B-B14F-4D97-AF65-F5344CB8AC3E}">
@@ -10062,4 +10851,299 @@
     </a:ext>
   </a:extLst>
 </a:theme>
+</file>
+
+<file path=ppt/theme/theme2.xml><?xml version="1.0" encoding="utf-8"?>
+<a:theme xmlns:a="http://schemas.openxmlformats.org/drawingml/2006/main" name="Office Theme">
+  <a:themeElements>
+    <a:clrScheme name="Office">
+      <a:dk1>
+        <a:sysClr val="windowText" lastClr="000000"/>
+      </a:dk1>
+      <a:lt1>
+        <a:sysClr val="window" lastClr="FFFFFF"/>
+      </a:lt1>
+      <a:dk2>
+        <a:srgbClr val="44546A"/>
+      </a:dk2>
+      <a:lt2>
+        <a:srgbClr val="E7E6E6"/>
+      </a:lt2>
+      <a:accent1>
+        <a:srgbClr val="4472C4"/>
+      </a:accent1>
+      <a:accent2>
+        <a:srgbClr val="ED7D31"/>
+      </a:accent2>
+      <a:accent3>
+        <a:srgbClr val="A5A5A5"/>
+      </a:accent3>
+      <a:accent4>
+        <a:srgbClr val="FFC000"/>
+      </a:accent4>
+      <a:accent5>
+        <a:srgbClr val="5B9BD5"/>
+      </a:accent5>
+      <a:accent6>
+        <a:srgbClr val="70AD47"/>
+      </a:accent6>
+      <a:hlink>
+        <a:srgbClr val="0563C1"/>
+      </a:hlink>
+      <a:folHlink>
+        <a:srgbClr val="954F72"/>
+      </a:folHlink>
+    </a:clrScheme>
+    <a:fontScheme name="Office">
+      <a:majorFont>
+        <a:latin typeface="Calibri Light" panose="020F0302020204030204"/>
+        <a:ea typeface=""/>
+        <a:cs typeface=""/>
+        <a:font script="Jpan" typeface="游ゴシック Light"/>
+        <a:font script="Hang" typeface="맑은 고딕"/>
+        <a:font script="Hans" typeface="等线 Light"/>
+        <a:font script="Hant" typeface="新細明體"/>
+        <a:font script="Arab" typeface="Times New Roman"/>
+        <a:font script="Hebr" typeface="Times New Roman"/>
+        <a:font script="Thai" typeface="Angsana New"/>
+        <a:font script="Ethi" typeface="Nyala"/>
+        <a:font script="Beng" typeface="Vrinda"/>
+        <a:font script="Gujr" typeface="Shruti"/>
+        <a:font script="Khmr" typeface="MoolBoran"/>
+        <a:font script="Knda" typeface="Tunga"/>
+        <a:font script="Guru" typeface="Raavi"/>
+        <a:font script="Cans" typeface="Euphemia"/>
+        <a:font script="Cher" typeface="Plantagenet Cherokee"/>
+        <a:font script="Yiii" typeface="Microsoft Yi Baiti"/>
+        <a:font script="Tibt" typeface="Microsoft Himalaya"/>
+        <a:font script="Thaa" typeface="MV Boli"/>
+        <a:font script="Deva" typeface="Mangal"/>
+        <a:font script="Telu" typeface="Gautami"/>
+        <a:font script="Taml" typeface="Latha"/>
+        <a:font script="Syrc" typeface="Estrangelo Edessa"/>
+        <a:font script="Orya" typeface="Kalinga"/>
+        <a:font script="Mlym" typeface="Kartika"/>
+        <a:font script="Laoo" typeface="DokChampa"/>
+        <a:font script="Sinh" typeface="Iskoola Pota"/>
+        <a:font script="Mong" typeface="Mongolian Baiti"/>
+        <a:font script="Viet" typeface="Times New Roman"/>
+        <a:font script="Uigh" typeface="Microsoft Uighur"/>
+        <a:font script="Geor" typeface="Sylfaen"/>
+        <a:font script="Armn" typeface="Arial"/>
+        <a:font script="Bugi" typeface="Leelawadee UI"/>
+        <a:font script="Bopo" typeface="Microsoft JhengHei"/>
+        <a:font script="Java" typeface="Javanese Text"/>
+        <a:font script="Lisu" typeface="Segoe UI"/>
+        <a:font script="Mymr" typeface="Myanmar Text"/>
+        <a:font script="Nkoo" typeface="Ebrima"/>
+        <a:font script="Olck" typeface="Nirmala UI"/>
+        <a:font script="Osma" typeface="Ebrima"/>
+        <a:font script="Phag" typeface="Phagspa"/>
+        <a:font script="Syrn" typeface="Estrangelo Edessa"/>
+        <a:font script="Syrj" typeface="Estrangelo Edessa"/>
+        <a:font script="Syre" typeface="Estrangelo Edessa"/>
+        <a:font script="Sora" typeface="Nirmala UI"/>
+        <a:font script="Tale" typeface="Microsoft Tai Le"/>
+        <a:font script="Talu" typeface="Microsoft New Tai Lue"/>
+        <a:font script="Tfng" typeface="Ebrima"/>
+      </a:majorFont>
+      <a:minorFont>
+        <a:latin typeface="Calibri" panose="020F0502020204030204"/>
+        <a:ea typeface=""/>
+        <a:cs typeface=""/>
+        <a:font script="Jpan" typeface="游ゴシック"/>
+        <a:font script="Hang" typeface="맑은 고딕"/>
+        <a:font script="Hans" typeface="等线"/>
+        <a:font script="Hant" typeface="新細明體"/>
+        <a:font script="Arab" typeface="Arial"/>
+        <a:font script="Hebr" typeface="Arial"/>
+        <a:font script="Thai" typeface="Cordia New"/>
+        <a:font script="Ethi" typeface="Nyala"/>
+        <a:font script="Beng" typeface="Vrinda"/>
+        <a:font script="Gujr" typeface="Shruti"/>
+        <a:font script="Khmr" typeface="DaunPenh"/>
+        <a:font script="Knda" typeface="Tunga"/>
+        <a:font script="Guru" typeface="Raavi"/>
+        <a:font script="Cans" typeface="Euphemia"/>
+        <a:font script="Cher" typeface="Plantagenet Cherokee"/>
+        <a:font script="Yiii" typeface="Microsoft Yi Baiti"/>
+        <a:font script="Tibt" typeface="Microsoft Himalaya"/>
+        <a:font script="Thaa" typeface="MV Boli"/>
+        <a:font script="Deva" typeface="Mangal"/>
+        <a:font script="Telu" typeface="Gautami"/>
+        <a:font script="Taml" typeface="Latha"/>
+        <a:font script="Syrc" typeface="Estrangelo Edessa"/>
+        <a:font script="Orya" typeface="Kalinga"/>
+        <a:font script="Mlym" typeface="Kartika"/>
+        <a:font script="Laoo" typeface="DokChampa"/>
+        <a:font script="Sinh" typeface="Iskoola Pota"/>
+        <a:font script="Mong" typeface="Mongolian Baiti"/>
+        <a:font script="Viet" typeface="Arial"/>
+        <a:font script="Uigh" typeface="Microsoft Uighur"/>
+        <a:font script="Geor" typeface="Sylfaen"/>
+        <a:font script="Armn" typeface="Arial"/>
+        <a:font script="Bugi" typeface="Leelawadee UI"/>
+        <a:font script="Bopo" typeface="Microsoft JhengHei"/>
+        <a:font script="Java" typeface="Javanese Text"/>
+        <a:font script="Lisu" typeface="Segoe UI"/>
+        <a:font script="Mymr" typeface="Myanmar Text"/>
+        <a:font script="Nkoo" typeface="Ebrima"/>
+        <a:font script="Olck" typeface="Nirmala UI"/>
+        <a:font script="Osma" typeface="Ebrima"/>
+        <a:font script="Phag" typeface="Phagspa"/>
+        <a:font script="Syrn" typeface="Estrangelo Edessa"/>
+        <a:font script="Syrj" typeface="Estrangelo Edessa"/>
+        <a:font script="Syre" typeface="Estrangelo Edessa"/>
+        <a:font script="Sora" typeface="Nirmala UI"/>
+        <a:font script="Tale" typeface="Microsoft Tai Le"/>
+        <a:font script="Talu" typeface="Microsoft New Tai Lue"/>
+        <a:font script="Tfng" typeface="Ebrima"/>
+      </a:minorFont>
+    </a:fontScheme>
+    <a:fmtScheme name="Office">
+      <a:fillStyleLst>
+        <a:solidFill>
+          <a:schemeClr val="phClr"/>
+        </a:solidFill>
+        <a:gradFill rotWithShape="1">
+          <a:gsLst>
+            <a:gs pos="0">
+              <a:schemeClr val="phClr">
+                <a:lumMod val="110000"/>
+                <a:satMod val="105000"/>
+                <a:tint val="67000"/>
+              </a:schemeClr>
+            </a:gs>
+            <a:gs pos="50000">
+              <a:schemeClr val="phClr">
+                <a:lumMod val="105000"/>
+                <a:satMod val="103000"/>
+                <a:tint val="73000"/>
+              </a:schemeClr>
+            </a:gs>
+            <a:gs pos="100000">
+              <a:schemeClr val="phClr">
+                <a:lumMod val="105000"/>
+                <a:satMod val="109000"/>
+                <a:tint val="81000"/>
+              </a:schemeClr>
+            </a:gs>
+          </a:gsLst>
+          <a:lin ang="5400000" scaled="0"/>
+        </a:gradFill>
+        <a:gradFill rotWithShape="1">
+          <a:gsLst>
+            <a:gs pos="0">
+              <a:schemeClr val="phClr">
+                <a:satMod val="103000"/>
+                <a:lumMod val="102000"/>
+                <a:tint val="94000"/>
+              </a:schemeClr>
+            </a:gs>
+            <a:gs pos="50000">
+              <a:schemeClr val="phClr">
+                <a:satMod val="110000"/>
+                <a:lumMod val="100000"/>
+                <a:shade val="100000"/>
+              </a:schemeClr>
+            </a:gs>
+            <a:gs pos="100000">
+              <a:schemeClr val="phClr">
+                <a:lumMod val="99000"/>
+                <a:satMod val="120000"/>
+                <a:shade val="78000"/>
+              </a:schemeClr>
+            </a:gs>
+          </a:gsLst>
+          <a:lin ang="5400000" scaled="0"/>
+        </a:gradFill>
+      </a:fillStyleLst>
+      <a:lnStyleLst>
+        <a:ln w="6350" cap="flat" cmpd="sng" algn="ctr">
+          <a:solidFill>
+            <a:schemeClr val="phClr"/>
+          </a:solidFill>
+          <a:prstDash val="solid"/>
+          <a:miter lim="800000"/>
+        </a:ln>
+        <a:ln w="12700" cap="flat" cmpd="sng" algn="ctr">
+          <a:solidFill>
+            <a:schemeClr val="phClr"/>
+          </a:solidFill>
+          <a:prstDash val="solid"/>
+          <a:miter lim="800000"/>
+        </a:ln>
+        <a:ln w="19050" cap="flat" cmpd="sng" algn="ctr">
+          <a:solidFill>
+            <a:schemeClr val="phClr"/>
+          </a:solidFill>
+          <a:prstDash val="solid"/>
+          <a:miter lim="800000"/>
+        </a:ln>
+      </a:lnStyleLst>
+      <a:effectStyleLst>
+        <a:effectStyle>
+          <a:effectLst/>
+        </a:effectStyle>
+        <a:effectStyle>
+          <a:effectLst/>
+        </a:effectStyle>
+        <a:effectStyle>
+          <a:effectLst>
+            <a:outerShdw blurRad="57150" dist="19050" dir="5400000" algn="ctr" rotWithShape="0">
+              <a:srgbClr val="000000">
+                <a:alpha val="63000"/>
+              </a:srgbClr>
+            </a:outerShdw>
+          </a:effectLst>
+        </a:effectStyle>
+      </a:effectStyleLst>
+      <a:bgFillStyleLst>
+        <a:solidFill>
+          <a:schemeClr val="phClr"/>
+        </a:solidFill>
+        <a:solidFill>
+          <a:schemeClr val="phClr">
+            <a:tint val="95000"/>
+            <a:satMod val="170000"/>
+          </a:schemeClr>
+        </a:solidFill>
+        <a:gradFill rotWithShape="1">
+          <a:gsLst>
+            <a:gs pos="0">
+              <a:schemeClr val="phClr">
+                <a:tint val="93000"/>
+                <a:satMod val="150000"/>
+                <a:shade val="98000"/>
+                <a:lumMod val="102000"/>
+              </a:schemeClr>
+            </a:gs>
+            <a:gs pos="50000">
+              <a:schemeClr val="phClr">
+                <a:tint val="98000"/>
+                <a:satMod val="130000"/>
+                <a:shade val="90000"/>
+                <a:lumMod val="103000"/>
+              </a:schemeClr>
+            </a:gs>
+            <a:gs pos="100000">
+              <a:schemeClr val="phClr">
+                <a:shade val="63000"/>
+                <a:satMod val="120000"/>
+              </a:schemeClr>
+            </a:gs>
+          </a:gsLst>
+          <a:lin ang="5400000" scaled="0"/>
+        </a:gradFill>
+      </a:bgFillStyleLst>
+    </a:fmtScheme>
+  </a:themeElements>
+  <a:objectDefaults/>
+  <a:extraClrSchemeLst/>
+  <a:extLst>
+    <a:ext uri="{05A4C25C-085E-4340-85A3-A5531E510DB2}">
+      <thm15:themeFamily xmlns:thm15="http://schemas.microsoft.com/office/thememl/2012/main" name="Office Theme" id="{62F939B6-93AF-4DB8-9C6B-D6C7DFDC589F}" vid="{4A3C46E8-61CC-4603-A589-7422A47A8E4A}"/>
+    </a:ext>
+  </a:extLst>
+</a:theme>
 </file>
</xml_diff>

<commit_message>
working on presentations andn proposals
</commit_message>
<xml_diff>
--- a/miscellaneous/presentations/20200813_surf_poster_pres.pptx
+++ b/miscellaneous/presentations/20200813_surf_poster_pres.pptx
@@ -208,7 +208,7 @@
           <a:p>
             <a:fld id="{D0122DAE-40C7-2D42-B6C8-B9C4D6CB2DF1}" type="datetimeFigureOut">
               <a:rPr lang="en-US" smtClean="0"/>
-              <a:t>8/18/20</a:t>
+              <a:t>8/20/20</a:t>
             </a:fld>
             <a:endParaRPr lang="en-US"/>
           </a:p>
@@ -706,7 +706,7 @@
           <a:p>
             <a:fld id="{985D6BDF-9D0E-4E2B-85B8-D8F4790360C9}" type="datetimeFigureOut">
               <a:rPr lang="en-US" smtClean="0"/>
-              <a:t>8/18/20</a:t>
+              <a:t>8/20/20</a:t>
             </a:fld>
             <a:endParaRPr lang="en-US" dirty="0"/>
           </a:p>
@@ -904,7 +904,7 @@
           <a:p>
             <a:fld id="{985D6BDF-9D0E-4E2B-85B8-D8F4790360C9}" type="datetimeFigureOut">
               <a:rPr lang="en-US" smtClean="0"/>
-              <a:t>8/18/20</a:t>
+              <a:t>8/20/20</a:t>
             </a:fld>
             <a:endParaRPr lang="en-US" dirty="0"/>
           </a:p>
@@ -1112,7 +1112,7 @@
           <a:p>
             <a:fld id="{985D6BDF-9D0E-4E2B-85B8-D8F4790360C9}" type="datetimeFigureOut">
               <a:rPr lang="en-US" smtClean="0"/>
-              <a:t>8/18/20</a:t>
+              <a:t>8/20/20</a:t>
             </a:fld>
             <a:endParaRPr lang="en-US" dirty="0"/>
           </a:p>
@@ -2793,7 +2793,7 @@
           <a:p>
             <a:fld id="{985D6BDF-9D0E-4E2B-85B8-D8F4790360C9}" type="datetimeFigureOut">
               <a:rPr lang="en-US" smtClean="0"/>
-              <a:t>8/18/20</a:t>
+              <a:t>8/20/20</a:t>
             </a:fld>
             <a:endParaRPr lang="en-US" dirty="0"/>
           </a:p>
@@ -3068,7 +3068,7 @@
           <a:p>
             <a:fld id="{985D6BDF-9D0E-4E2B-85B8-D8F4790360C9}" type="datetimeFigureOut">
               <a:rPr lang="en-US" smtClean="0"/>
-              <a:t>8/18/20</a:t>
+              <a:t>8/20/20</a:t>
             </a:fld>
             <a:endParaRPr lang="en-US" dirty="0"/>
           </a:p>
@@ -3333,7 +3333,7 @@
           <a:p>
             <a:fld id="{985D6BDF-9D0E-4E2B-85B8-D8F4790360C9}" type="datetimeFigureOut">
               <a:rPr lang="en-US" smtClean="0"/>
-              <a:t>8/18/20</a:t>
+              <a:t>8/20/20</a:t>
             </a:fld>
             <a:endParaRPr lang="en-US" dirty="0"/>
           </a:p>
@@ -3745,7 +3745,7 @@
           <a:p>
             <a:fld id="{985D6BDF-9D0E-4E2B-85B8-D8F4790360C9}" type="datetimeFigureOut">
               <a:rPr lang="en-US" smtClean="0"/>
-              <a:t>8/18/20</a:t>
+              <a:t>8/20/20</a:t>
             </a:fld>
             <a:endParaRPr lang="en-US" dirty="0"/>
           </a:p>
@@ -3886,7 +3886,7 @@
           <a:p>
             <a:fld id="{985D6BDF-9D0E-4E2B-85B8-D8F4790360C9}" type="datetimeFigureOut">
               <a:rPr lang="en-US" smtClean="0"/>
-              <a:t>8/18/20</a:t>
+              <a:t>8/20/20</a:t>
             </a:fld>
             <a:endParaRPr lang="en-US" dirty="0"/>
           </a:p>
@@ -3999,7 +3999,7 @@
           <a:p>
             <a:fld id="{985D6BDF-9D0E-4E2B-85B8-D8F4790360C9}" type="datetimeFigureOut">
               <a:rPr lang="en-US" smtClean="0"/>
-              <a:t>8/18/20</a:t>
+              <a:t>8/20/20</a:t>
             </a:fld>
             <a:endParaRPr lang="en-US" dirty="0"/>
           </a:p>
@@ -4310,7 +4310,7 @@
           <a:p>
             <a:fld id="{985D6BDF-9D0E-4E2B-85B8-D8F4790360C9}" type="datetimeFigureOut">
               <a:rPr lang="en-US" smtClean="0"/>
-              <a:t>8/18/20</a:t>
+              <a:t>8/20/20</a:t>
             </a:fld>
             <a:endParaRPr lang="en-US" dirty="0"/>
           </a:p>
@@ -4598,7 +4598,7 @@
           <a:p>
             <a:fld id="{985D6BDF-9D0E-4E2B-85B8-D8F4790360C9}" type="datetimeFigureOut">
               <a:rPr lang="en-US" smtClean="0"/>
-              <a:t>8/18/20</a:t>
+              <a:t>8/20/20</a:t>
             </a:fld>
             <a:endParaRPr lang="en-US" dirty="0"/>
           </a:p>
@@ -4839,7 +4839,7 @@
           <a:p>
             <a:fld id="{985D6BDF-9D0E-4E2B-85B8-D8F4790360C9}" type="datetimeFigureOut">
               <a:rPr lang="en-US" smtClean="0"/>
-              <a:t>8/18/20</a:t>
+              <a:t>8/20/20</a:t>
             </a:fld>
             <a:endParaRPr lang="en-US" dirty="0"/>
           </a:p>
@@ -5267,7 +5267,7 @@
         </p:nvSpPr>
         <p:spPr bwMode="auto">
           <a:xfrm>
-            <a:off x="6705600" y="225732"/>
+            <a:off x="6700362" y="364996"/>
             <a:ext cx="26822400" cy="2877650"/>
           </a:xfrm>
           <a:prstGeom prst="rect">

</xml_diff>